<commit_message>
added collision and collision effects
</commit_message>
<xml_diff>
--- a/Flowcharts and Wireframes.pptx
+++ b/Flowcharts and Wireframes.pptx
@@ -5,8 +5,8 @@
     <p:sldMasterId id="2147483648" r:id="rId1"/>
   </p:sldMasterIdLst>
   <p:sldIdLst>
-    <p:sldId id="256" r:id="rId2"/>
-    <p:sldId id="257" r:id="rId3"/>
+    <p:sldId id="257" r:id="rId2"/>
+    <p:sldId id="256" r:id="rId3"/>
   </p:sldIdLst>
   <p:sldSz cx="9144000" cy="6858000" type="screen4x3"/>
   <p:notesSz cx="6858000" cy="9144000"/>
@@ -3080,6 +3080,1724 @@
 </file>
 
 <file path=ppt/slides/slide1.xml><?xml version="1.0" encoding="utf-8"?>
+<p:sld xmlns:a="http://schemas.openxmlformats.org/drawingml/2006/main" xmlns:r="http://schemas.openxmlformats.org/officeDocument/2006/relationships" xmlns:p="http://schemas.openxmlformats.org/presentationml/2006/main">
+  <p:cSld>
+    <p:spTree>
+      <p:nvGrpSpPr>
+        <p:cNvPr id="1" name=""/>
+        <p:cNvGrpSpPr/>
+        <p:nvPr/>
+      </p:nvGrpSpPr>
+      <p:grpSpPr>
+        <a:xfrm>
+          <a:off x="0" y="0"/>
+          <a:ext cx="0" cy="0"/>
+          <a:chOff x="0" y="0"/>
+          <a:chExt cx="0" cy="0"/>
+        </a:xfrm>
+      </p:grpSpPr>
+      <p:sp>
+        <p:nvSpPr>
+          <p:cNvPr id="26" name="Rectangle 25"/>
+          <p:cNvSpPr/>
+          <p:nvPr/>
+        </p:nvSpPr>
+        <p:spPr>
+          <a:xfrm>
+            <a:off x="341914" y="751145"/>
+            <a:ext cx="8450003" cy="5712062"/>
+          </a:xfrm>
+          <a:prstGeom prst="rect">
+            <a:avLst/>
+          </a:prstGeom>
+          <a:solidFill>
+            <a:schemeClr val="bg1">
+              <a:lumMod val="85000"/>
+              <a:alpha val="23000"/>
+            </a:schemeClr>
+          </a:solidFill>
+          <a:ln>
+            <a:noFill/>
+          </a:ln>
+        </p:spPr>
+        <p:style>
+          <a:lnRef idx="1">
+            <a:schemeClr val="accent1"/>
+          </a:lnRef>
+          <a:fillRef idx="3">
+            <a:schemeClr val="accent1"/>
+          </a:fillRef>
+          <a:effectRef idx="2">
+            <a:schemeClr val="accent1"/>
+          </a:effectRef>
+          <a:fontRef idx="minor">
+            <a:schemeClr val="lt1"/>
+          </a:fontRef>
+        </p:style>
+        <p:txBody>
+          <a:bodyPr rtlCol="0" anchor="ctr"/>
+          <a:lstStyle/>
+          <a:p>
+            <a:pPr algn="ctr"/>
+            <a:endParaRPr lang="en-US"/>
+          </a:p>
+        </p:txBody>
+      </p:sp>
+      <p:sp>
+        <p:nvSpPr>
+          <p:cNvPr id="4" name="TextBox 3"/>
+          <p:cNvSpPr txBox="1"/>
+          <p:nvPr/>
+        </p:nvSpPr>
+        <p:spPr>
+          <a:xfrm>
+            <a:off x="358195" y="211645"/>
+            <a:ext cx="2767825" cy="523220"/>
+          </a:xfrm>
+          <a:prstGeom prst="rect">
+            <a:avLst/>
+          </a:prstGeom>
+          <a:noFill/>
+        </p:spPr>
+        <p:txBody>
+          <a:bodyPr wrap="square" rtlCol="0">
+            <a:spAutoFit/>
+          </a:bodyPr>
+          <a:lstStyle/>
+          <a:p>
+            <a:r>
+              <a:rPr lang="en-US" sz="2800" dirty="0" smtClean="0">
+                <a:latin typeface="Avenir Black"/>
+                <a:cs typeface="Avenir Black"/>
+              </a:rPr>
+              <a:t>Wireframe</a:t>
+            </a:r>
+            <a:endParaRPr lang="en-US" sz="2800" dirty="0">
+              <a:latin typeface="Avenir Black"/>
+              <a:cs typeface="Avenir Black"/>
+            </a:endParaRPr>
+          </a:p>
+        </p:txBody>
+      </p:sp>
+      <p:sp>
+        <p:nvSpPr>
+          <p:cNvPr id="3" name="TextBox 2"/>
+          <p:cNvSpPr txBox="1"/>
+          <p:nvPr/>
+        </p:nvSpPr>
+        <p:spPr>
+          <a:xfrm>
+            <a:off x="3760986" y="6463444"/>
+            <a:ext cx="1790946" cy="276999"/>
+          </a:xfrm>
+          <a:prstGeom prst="rect">
+            <a:avLst/>
+          </a:prstGeom>
+          <a:noFill/>
+        </p:spPr>
+        <p:txBody>
+          <a:bodyPr wrap="square" rtlCol="0">
+            <a:spAutoFit/>
+          </a:bodyPr>
+          <a:lstStyle/>
+          <a:p>
+            <a:pPr algn="ctr"/>
+            <a:r>
+              <a:rPr lang="en-US" sz="1200" dirty="0" smtClean="0"/>
+              <a:t>720px</a:t>
+            </a:r>
+            <a:endParaRPr lang="en-US" sz="1200" dirty="0"/>
+          </a:p>
+        </p:txBody>
+      </p:sp>
+      <p:sp>
+        <p:nvSpPr>
+          <p:cNvPr id="5" name="TextBox 4"/>
+          <p:cNvSpPr txBox="1"/>
+          <p:nvPr/>
+        </p:nvSpPr>
+        <p:spPr>
+          <a:xfrm rot="16200000">
+            <a:off x="8034944" y="3457501"/>
+            <a:ext cx="1790946" cy="276999"/>
+          </a:xfrm>
+          <a:prstGeom prst="rect">
+            <a:avLst/>
+          </a:prstGeom>
+          <a:noFill/>
+        </p:spPr>
+        <p:txBody>
+          <a:bodyPr wrap="square" rtlCol="0">
+            <a:spAutoFit/>
+          </a:bodyPr>
+          <a:lstStyle/>
+          <a:p>
+            <a:pPr algn="ctr"/>
+            <a:r>
+              <a:rPr lang="en-US" sz="1200" dirty="0" smtClean="0"/>
+              <a:t>480px</a:t>
+            </a:r>
+            <a:endParaRPr lang="en-US" sz="1200" dirty="0"/>
+          </a:p>
+        </p:txBody>
+      </p:sp>
+      <p:sp>
+        <p:nvSpPr>
+          <p:cNvPr id="6" name="Rectangle 5"/>
+          <p:cNvSpPr/>
+          <p:nvPr/>
+        </p:nvSpPr>
+        <p:spPr>
+          <a:xfrm>
+            <a:off x="895473" y="1400090"/>
+            <a:ext cx="1221099" cy="260482"/>
+          </a:xfrm>
+          <a:prstGeom prst="rect">
+            <a:avLst/>
+          </a:prstGeom>
+          <a:solidFill>
+            <a:schemeClr val="accent6">
+              <a:lumMod val="60000"/>
+              <a:lumOff val="40000"/>
+            </a:schemeClr>
+          </a:solidFill>
+          <a:ln>
+            <a:noFill/>
+          </a:ln>
+        </p:spPr>
+        <p:style>
+          <a:lnRef idx="1">
+            <a:schemeClr val="accent1"/>
+          </a:lnRef>
+          <a:fillRef idx="3">
+            <a:schemeClr val="accent1"/>
+          </a:fillRef>
+          <a:effectRef idx="2">
+            <a:schemeClr val="accent1"/>
+          </a:effectRef>
+          <a:fontRef idx="minor">
+            <a:schemeClr val="lt1"/>
+          </a:fontRef>
+        </p:style>
+        <p:txBody>
+          <a:bodyPr rtlCol="0" anchor="ctr"/>
+          <a:lstStyle/>
+          <a:p>
+            <a:pPr algn="ctr"/>
+            <a:r>
+              <a:rPr lang="en-US" sz="1200" dirty="0" smtClean="0">
+                <a:solidFill>
+                  <a:srgbClr val="000000"/>
+                </a:solidFill>
+              </a:rPr>
+              <a:t>Kitty Graphic</a:t>
+            </a:r>
+            <a:endParaRPr lang="en-US" sz="1200" dirty="0">
+              <a:solidFill>
+                <a:srgbClr val="000000"/>
+              </a:solidFill>
+            </a:endParaRPr>
+          </a:p>
+        </p:txBody>
+      </p:sp>
+      <p:sp>
+        <p:nvSpPr>
+          <p:cNvPr id="7" name="Rectangle 6"/>
+          <p:cNvSpPr/>
+          <p:nvPr/>
+        </p:nvSpPr>
+        <p:spPr>
+          <a:xfrm>
+            <a:off x="895473" y="1812972"/>
+            <a:ext cx="1221099" cy="260482"/>
+          </a:xfrm>
+          <a:prstGeom prst="rect">
+            <a:avLst/>
+          </a:prstGeom>
+          <a:solidFill>
+            <a:schemeClr val="accent6">
+              <a:lumMod val="60000"/>
+              <a:lumOff val="40000"/>
+            </a:schemeClr>
+          </a:solidFill>
+          <a:ln>
+            <a:noFill/>
+          </a:ln>
+        </p:spPr>
+        <p:style>
+          <a:lnRef idx="1">
+            <a:schemeClr val="accent1"/>
+          </a:lnRef>
+          <a:fillRef idx="3">
+            <a:schemeClr val="accent1"/>
+          </a:fillRef>
+          <a:effectRef idx="2">
+            <a:schemeClr val="accent1"/>
+          </a:effectRef>
+          <a:fontRef idx="minor">
+            <a:schemeClr val="lt1"/>
+          </a:fontRef>
+        </p:style>
+        <p:txBody>
+          <a:bodyPr rtlCol="0" anchor="ctr"/>
+          <a:lstStyle/>
+          <a:p>
+            <a:pPr algn="ctr"/>
+            <a:r>
+              <a:rPr lang="en-US" sz="1200" dirty="0" smtClean="0">
+                <a:solidFill>
+                  <a:srgbClr val="000000"/>
+                </a:solidFill>
+              </a:rPr>
+              <a:t>Kitty Graphic</a:t>
+            </a:r>
+            <a:endParaRPr lang="en-US" sz="1200" dirty="0">
+              <a:solidFill>
+                <a:srgbClr val="000000"/>
+              </a:solidFill>
+            </a:endParaRPr>
+          </a:p>
+        </p:txBody>
+      </p:sp>
+      <p:sp>
+        <p:nvSpPr>
+          <p:cNvPr id="8" name="Rectangle 7"/>
+          <p:cNvSpPr/>
+          <p:nvPr/>
+        </p:nvSpPr>
+        <p:spPr>
+          <a:xfrm>
+            <a:off x="895473" y="2225854"/>
+            <a:ext cx="1221099" cy="260482"/>
+          </a:xfrm>
+          <a:prstGeom prst="rect">
+            <a:avLst/>
+          </a:prstGeom>
+          <a:solidFill>
+            <a:schemeClr val="accent6">
+              <a:lumMod val="60000"/>
+              <a:lumOff val="40000"/>
+            </a:schemeClr>
+          </a:solidFill>
+          <a:ln>
+            <a:noFill/>
+          </a:ln>
+        </p:spPr>
+        <p:style>
+          <a:lnRef idx="1">
+            <a:schemeClr val="accent1"/>
+          </a:lnRef>
+          <a:fillRef idx="3">
+            <a:schemeClr val="accent1"/>
+          </a:fillRef>
+          <a:effectRef idx="2">
+            <a:schemeClr val="accent1"/>
+          </a:effectRef>
+          <a:fontRef idx="minor">
+            <a:schemeClr val="lt1"/>
+          </a:fontRef>
+        </p:style>
+        <p:txBody>
+          <a:bodyPr rtlCol="0" anchor="ctr"/>
+          <a:lstStyle/>
+          <a:p>
+            <a:pPr algn="ctr"/>
+            <a:r>
+              <a:rPr lang="en-US" sz="1200" dirty="0" smtClean="0">
+                <a:solidFill>
+                  <a:srgbClr val="000000"/>
+                </a:solidFill>
+              </a:rPr>
+              <a:t>Kitty Graphic</a:t>
+            </a:r>
+            <a:endParaRPr lang="en-US" sz="1200" dirty="0">
+              <a:solidFill>
+                <a:srgbClr val="000000"/>
+              </a:solidFill>
+            </a:endParaRPr>
+          </a:p>
+        </p:txBody>
+      </p:sp>
+      <p:sp>
+        <p:nvSpPr>
+          <p:cNvPr id="9" name="Rectangle 8"/>
+          <p:cNvSpPr/>
+          <p:nvPr/>
+        </p:nvSpPr>
+        <p:spPr>
+          <a:xfrm>
+            <a:off x="895473" y="2667967"/>
+            <a:ext cx="1221099" cy="260482"/>
+          </a:xfrm>
+          <a:prstGeom prst="rect">
+            <a:avLst/>
+          </a:prstGeom>
+          <a:solidFill>
+            <a:schemeClr val="accent6">
+              <a:lumMod val="60000"/>
+              <a:lumOff val="40000"/>
+            </a:schemeClr>
+          </a:solidFill>
+          <a:ln>
+            <a:noFill/>
+          </a:ln>
+        </p:spPr>
+        <p:style>
+          <a:lnRef idx="1">
+            <a:schemeClr val="accent1"/>
+          </a:lnRef>
+          <a:fillRef idx="3">
+            <a:schemeClr val="accent1"/>
+          </a:fillRef>
+          <a:effectRef idx="2">
+            <a:schemeClr val="accent1"/>
+          </a:effectRef>
+          <a:fontRef idx="minor">
+            <a:schemeClr val="lt1"/>
+          </a:fontRef>
+        </p:style>
+        <p:txBody>
+          <a:bodyPr rtlCol="0" anchor="ctr"/>
+          <a:lstStyle/>
+          <a:p>
+            <a:pPr algn="ctr"/>
+            <a:r>
+              <a:rPr lang="en-US" sz="1200" dirty="0" smtClean="0">
+                <a:solidFill>
+                  <a:srgbClr val="000000"/>
+                </a:solidFill>
+              </a:rPr>
+              <a:t>Kitty Graphic</a:t>
+            </a:r>
+            <a:endParaRPr lang="en-US" sz="1200" dirty="0">
+              <a:solidFill>
+                <a:srgbClr val="000000"/>
+              </a:solidFill>
+            </a:endParaRPr>
+          </a:p>
+        </p:txBody>
+      </p:sp>
+      <p:sp>
+        <p:nvSpPr>
+          <p:cNvPr id="10" name="Rectangle 9"/>
+          <p:cNvSpPr/>
+          <p:nvPr/>
+        </p:nvSpPr>
+        <p:spPr>
+          <a:xfrm>
+            <a:off x="2350378" y="1403997"/>
+            <a:ext cx="1221099" cy="260482"/>
+          </a:xfrm>
+          <a:prstGeom prst="rect">
+            <a:avLst/>
+          </a:prstGeom>
+          <a:solidFill>
+            <a:schemeClr val="accent6">
+              <a:lumMod val="60000"/>
+              <a:lumOff val="40000"/>
+            </a:schemeClr>
+          </a:solidFill>
+          <a:ln>
+            <a:noFill/>
+          </a:ln>
+        </p:spPr>
+        <p:style>
+          <a:lnRef idx="1">
+            <a:schemeClr val="accent1"/>
+          </a:lnRef>
+          <a:fillRef idx="3">
+            <a:schemeClr val="accent1"/>
+          </a:fillRef>
+          <a:effectRef idx="2">
+            <a:schemeClr val="accent1"/>
+          </a:effectRef>
+          <a:fontRef idx="minor">
+            <a:schemeClr val="lt1"/>
+          </a:fontRef>
+        </p:style>
+        <p:txBody>
+          <a:bodyPr rtlCol="0" anchor="ctr"/>
+          <a:lstStyle/>
+          <a:p>
+            <a:pPr algn="ctr"/>
+            <a:r>
+              <a:rPr lang="en-US" sz="1200" dirty="0" smtClean="0">
+                <a:solidFill>
+                  <a:srgbClr val="000000"/>
+                </a:solidFill>
+              </a:rPr>
+              <a:t>Kitty Graphic</a:t>
+            </a:r>
+            <a:endParaRPr lang="en-US" sz="1200" dirty="0">
+              <a:solidFill>
+                <a:srgbClr val="000000"/>
+              </a:solidFill>
+            </a:endParaRPr>
+          </a:p>
+        </p:txBody>
+      </p:sp>
+      <p:sp>
+        <p:nvSpPr>
+          <p:cNvPr id="11" name="Rectangle 10"/>
+          <p:cNvSpPr/>
+          <p:nvPr/>
+        </p:nvSpPr>
+        <p:spPr>
+          <a:xfrm>
+            <a:off x="2350378" y="1816879"/>
+            <a:ext cx="1221099" cy="260482"/>
+          </a:xfrm>
+          <a:prstGeom prst="rect">
+            <a:avLst/>
+          </a:prstGeom>
+          <a:solidFill>
+            <a:schemeClr val="accent6">
+              <a:lumMod val="60000"/>
+              <a:lumOff val="40000"/>
+            </a:schemeClr>
+          </a:solidFill>
+          <a:ln>
+            <a:noFill/>
+          </a:ln>
+        </p:spPr>
+        <p:style>
+          <a:lnRef idx="1">
+            <a:schemeClr val="accent1"/>
+          </a:lnRef>
+          <a:fillRef idx="3">
+            <a:schemeClr val="accent1"/>
+          </a:fillRef>
+          <a:effectRef idx="2">
+            <a:schemeClr val="accent1"/>
+          </a:effectRef>
+          <a:fontRef idx="minor">
+            <a:schemeClr val="lt1"/>
+          </a:fontRef>
+        </p:style>
+        <p:txBody>
+          <a:bodyPr rtlCol="0" anchor="ctr"/>
+          <a:lstStyle/>
+          <a:p>
+            <a:pPr algn="ctr"/>
+            <a:r>
+              <a:rPr lang="en-US" sz="1200" dirty="0" smtClean="0">
+                <a:solidFill>
+                  <a:srgbClr val="000000"/>
+                </a:solidFill>
+              </a:rPr>
+              <a:t>Kitty Graphic</a:t>
+            </a:r>
+            <a:endParaRPr lang="en-US" sz="1200" dirty="0">
+              <a:solidFill>
+                <a:srgbClr val="000000"/>
+              </a:solidFill>
+            </a:endParaRPr>
+          </a:p>
+        </p:txBody>
+      </p:sp>
+      <p:sp>
+        <p:nvSpPr>
+          <p:cNvPr id="12" name="Rectangle 11"/>
+          <p:cNvSpPr/>
+          <p:nvPr/>
+        </p:nvSpPr>
+        <p:spPr>
+          <a:xfrm>
+            <a:off x="2350378" y="2229761"/>
+            <a:ext cx="1221099" cy="260482"/>
+          </a:xfrm>
+          <a:prstGeom prst="rect">
+            <a:avLst/>
+          </a:prstGeom>
+          <a:solidFill>
+            <a:schemeClr val="accent6">
+              <a:lumMod val="60000"/>
+              <a:lumOff val="40000"/>
+            </a:schemeClr>
+          </a:solidFill>
+          <a:ln>
+            <a:noFill/>
+          </a:ln>
+        </p:spPr>
+        <p:style>
+          <a:lnRef idx="1">
+            <a:schemeClr val="accent1"/>
+          </a:lnRef>
+          <a:fillRef idx="3">
+            <a:schemeClr val="accent1"/>
+          </a:fillRef>
+          <a:effectRef idx="2">
+            <a:schemeClr val="accent1"/>
+          </a:effectRef>
+          <a:fontRef idx="minor">
+            <a:schemeClr val="lt1"/>
+          </a:fontRef>
+        </p:style>
+        <p:txBody>
+          <a:bodyPr rtlCol="0" anchor="ctr"/>
+          <a:lstStyle/>
+          <a:p>
+            <a:pPr algn="ctr"/>
+            <a:r>
+              <a:rPr lang="en-US" sz="1200" dirty="0" smtClean="0">
+                <a:solidFill>
+                  <a:srgbClr val="000000"/>
+                </a:solidFill>
+              </a:rPr>
+              <a:t>Kitty Graphic</a:t>
+            </a:r>
+            <a:endParaRPr lang="en-US" sz="1200" dirty="0">
+              <a:solidFill>
+                <a:srgbClr val="000000"/>
+              </a:solidFill>
+            </a:endParaRPr>
+          </a:p>
+        </p:txBody>
+      </p:sp>
+      <p:sp>
+        <p:nvSpPr>
+          <p:cNvPr id="13" name="Rectangle 12"/>
+          <p:cNvSpPr/>
+          <p:nvPr/>
+        </p:nvSpPr>
+        <p:spPr>
+          <a:xfrm>
+            <a:off x="2350378" y="2671874"/>
+            <a:ext cx="1221099" cy="260482"/>
+          </a:xfrm>
+          <a:prstGeom prst="rect">
+            <a:avLst/>
+          </a:prstGeom>
+          <a:solidFill>
+            <a:schemeClr val="accent6">
+              <a:lumMod val="60000"/>
+              <a:lumOff val="40000"/>
+            </a:schemeClr>
+          </a:solidFill>
+          <a:ln>
+            <a:noFill/>
+          </a:ln>
+        </p:spPr>
+        <p:style>
+          <a:lnRef idx="1">
+            <a:schemeClr val="accent1"/>
+          </a:lnRef>
+          <a:fillRef idx="3">
+            <a:schemeClr val="accent1"/>
+          </a:fillRef>
+          <a:effectRef idx="2">
+            <a:schemeClr val="accent1"/>
+          </a:effectRef>
+          <a:fontRef idx="minor">
+            <a:schemeClr val="lt1"/>
+          </a:fontRef>
+        </p:style>
+        <p:txBody>
+          <a:bodyPr rtlCol="0" anchor="ctr"/>
+          <a:lstStyle/>
+          <a:p>
+            <a:pPr algn="ctr"/>
+            <a:r>
+              <a:rPr lang="en-US" sz="1200" dirty="0" smtClean="0">
+                <a:solidFill>
+                  <a:srgbClr val="000000"/>
+                </a:solidFill>
+              </a:rPr>
+              <a:t>Kitty Graphic</a:t>
+            </a:r>
+            <a:endParaRPr lang="en-US" sz="1200" dirty="0">
+              <a:solidFill>
+                <a:srgbClr val="000000"/>
+              </a:solidFill>
+            </a:endParaRPr>
+          </a:p>
+        </p:txBody>
+      </p:sp>
+      <p:sp>
+        <p:nvSpPr>
+          <p:cNvPr id="14" name="Rectangle 13"/>
+          <p:cNvSpPr/>
+          <p:nvPr/>
+        </p:nvSpPr>
+        <p:spPr>
+          <a:xfrm>
+            <a:off x="3811150" y="1400090"/>
+            <a:ext cx="1221099" cy="260482"/>
+          </a:xfrm>
+          <a:prstGeom prst="rect">
+            <a:avLst/>
+          </a:prstGeom>
+          <a:solidFill>
+            <a:schemeClr val="accent6">
+              <a:lumMod val="60000"/>
+              <a:lumOff val="40000"/>
+            </a:schemeClr>
+          </a:solidFill>
+          <a:ln>
+            <a:noFill/>
+          </a:ln>
+        </p:spPr>
+        <p:style>
+          <a:lnRef idx="1">
+            <a:schemeClr val="accent1"/>
+          </a:lnRef>
+          <a:fillRef idx="3">
+            <a:schemeClr val="accent1"/>
+          </a:fillRef>
+          <a:effectRef idx="2">
+            <a:schemeClr val="accent1"/>
+          </a:effectRef>
+          <a:fontRef idx="minor">
+            <a:schemeClr val="lt1"/>
+          </a:fontRef>
+        </p:style>
+        <p:txBody>
+          <a:bodyPr rtlCol="0" anchor="ctr"/>
+          <a:lstStyle/>
+          <a:p>
+            <a:pPr algn="ctr"/>
+            <a:r>
+              <a:rPr lang="en-US" sz="1200" dirty="0" smtClean="0">
+                <a:solidFill>
+                  <a:srgbClr val="000000"/>
+                </a:solidFill>
+              </a:rPr>
+              <a:t>Kitty Graphic</a:t>
+            </a:r>
+            <a:endParaRPr lang="en-US" sz="1200" dirty="0">
+              <a:solidFill>
+                <a:srgbClr val="000000"/>
+              </a:solidFill>
+            </a:endParaRPr>
+          </a:p>
+        </p:txBody>
+      </p:sp>
+      <p:sp>
+        <p:nvSpPr>
+          <p:cNvPr id="15" name="Rectangle 14"/>
+          <p:cNvSpPr/>
+          <p:nvPr/>
+        </p:nvSpPr>
+        <p:spPr>
+          <a:xfrm>
+            <a:off x="3811150" y="1812972"/>
+            <a:ext cx="1221099" cy="260482"/>
+          </a:xfrm>
+          <a:prstGeom prst="rect">
+            <a:avLst/>
+          </a:prstGeom>
+          <a:solidFill>
+            <a:schemeClr val="accent6">
+              <a:lumMod val="60000"/>
+              <a:lumOff val="40000"/>
+            </a:schemeClr>
+          </a:solidFill>
+          <a:ln>
+            <a:noFill/>
+          </a:ln>
+        </p:spPr>
+        <p:style>
+          <a:lnRef idx="1">
+            <a:schemeClr val="accent1"/>
+          </a:lnRef>
+          <a:fillRef idx="3">
+            <a:schemeClr val="accent1"/>
+          </a:fillRef>
+          <a:effectRef idx="2">
+            <a:schemeClr val="accent1"/>
+          </a:effectRef>
+          <a:fontRef idx="minor">
+            <a:schemeClr val="lt1"/>
+          </a:fontRef>
+        </p:style>
+        <p:txBody>
+          <a:bodyPr rtlCol="0" anchor="ctr"/>
+          <a:lstStyle/>
+          <a:p>
+            <a:pPr algn="ctr"/>
+            <a:r>
+              <a:rPr lang="en-US" sz="1200" dirty="0" smtClean="0">
+                <a:solidFill>
+                  <a:srgbClr val="000000"/>
+                </a:solidFill>
+              </a:rPr>
+              <a:t>Kitty Graphic</a:t>
+            </a:r>
+            <a:endParaRPr lang="en-US" sz="1200" dirty="0">
+              <a:solidFill>
+                <a:srgbClr val="000000"/>
+              </a:solidFill>
+            </a:endParaRPr>
+          </a:p>
+        </p:txBody>
+      </p:sp>
+      <p:sp>
+        <p:nvSpPr>
+          <p:cNvPr id="16" name="Rectangle 15"/>
+          <p:cNvSpPr/>
+          <p:nvPr/>
+        </p:nvSpPr>
+        <p:spPr>
+          <a:xfrm>
+            <a:off x="3811150" y="2225854"/>
+            <a:ext cx="1221099" cy="260482"/>
+          </a:xfrm>
+          <a:prstGeom prst="rect">
+            <a:avLst/>
+          </a:prstGeom>
+          <a:solidFill>
+            <a:schemeClr val="accent6">
+              <a:lumMod val="60000"/>
+              <a:lumOff val="40000"/>
+            </a:schemeClr>
+          </a:solidFill>
+          <a:ln>
+            <a:noFill/>
+          </a:ln>
+        </p:spPr>
+        <p:style>
+          <a:lnRef idx="1">
+            <a:schemeClr val="accent1"/>
+          </a:lnRef>
+          <a:fillRef idx="3">
+            <a:schemeClr val="accent1"/>
+          </a:fillRef>
+          <a:effectRef idx="2">
+            <a:schemeClr val="accent1"/>
+          </a:effectRef>
+          <a:fontRef idx="minor">
+            <a:schemeClr val="lt1"/>
+          </a:fontRef>
+        </p:style>
+        <p:txBody>
+          <a:bodyPr rtlCol="0" anchor="ctr"/>
+          <a:lstStyle/>
+          <a:p>
+            <a:pPr algn="ctr"/>
+            <a:r>
+              <a:rPr lang="en-US" sz="1200" dirty="0" smtClean="0">
+                <a:solidFill>
+                  <a:srgbClr val="000000"/>
+                </a:solidFill>
+              </a:rPr>
+              <a:t>Kitty Graphic</a:t>
+            </a:r>
+            <a:endParaRPr lang="en-US" sz="1200" dirty="0">
+              <a:solidFill>
+                <a:srgbClr val="000000"/>
+              </a:solidFill>
+            </a:endParaRPr>
+          </a:p>
+        </p:txBody>
+      </p:sp>
+      <p:sp>
+        <p:nvSpPr>
+          <p:cNvPr id="17" name="Rectangle 16"/>
+          <p:cNvSpPr/>
+          <p:nvPr/>
+        </p:nvSpPr>
+        <p:spPr>
+          <a:xfrm>
+            <a:off x="3811150" y="2667967"/>
+            <a:ext cx="1221099" cy="260482"/>
+          </a:xfrm>
+          <a:prstGeom prst="rect">
+            <a:avLst/>
+          </a:prstGeom>
+          <a:solidFill>
+            <a:schemeClr val="accent6">
+              <a:lumMod val="60000"/>
+              <a:lumOff val="40000"/>
+            </a:schemeClr>
+          </a:solidFill>
+          <a:ln>
+            <a:noFill/>
+          </a:ln>
+        </p:spPr>
+        <p:style>
+          <a:lnRef idx="1">
+            <a:schemeClr val="accent1"/>
+          </a:lnRef>
+          <a:fillRef idx="3">
+            <a:schemeClr val="accent1"/>
+          </a:fillRef>
+          <a:effectRef idx="2">
+            <a:schemeClr val="accent1"/>
+          </a:effectRef>
+          <a:fontRef idx="minor">
+            <a:schemeClr val="lt1"/>
+          </a:fontRef>
+        </p:style>
+        <p:txBody>
+          <a:bodyPr rtlCol="0" anchor="ctr"/>
+          <a:lstStyle/>
+          <a:p>
+            <a:pPr algn="ctr"/>
+            <a:r>
+              <a:rPr lang="en-US" sz="1200" dirty="0" smtClean="0">
+                <a:solidFill>
+                  <a:srgbClr val="000000"/>
+                </a:solidFill>
+              </a:rPr>
+              <a:t>Kitty Graphic</a:t>
+            </a:r>
+            <a:endParaRPr lang="en-US" sz="1200" dirty="0">
+              <a:solidFill>
+                <a:srgbClr val="000000"/>
+              </a:solidFill>
+            </a:endParaRPr>
+          </a:p>
+        </p:txBody>
+      </p:sp>
+      <p:sp>
+        <p:nvSpPr>
+          <p:cNvPr id="18" name="Rectangle 17"/>
+          <p:cNvSpPr/>
+          <p:nvPr/>
+        </p:nvSpPr>
+        <p:spPr>
+          <a:xfrm>
+            <a:off x="5238041" y="1411811"/>
+            <a:ext cx="1221099" cy="260482"/>
+          </a:xfrm>
+          <a:prstGeom prst="rect">
+            <a:avLst/>
+          </a:prstGeom>
+          <a:solidFill>
+            <a:schemeClr val="accent6">
+              <a:lumMod val="60000"/>
+              <a:lumOff val="40000"/>
+            </a:schemeClr>
+          </a:solidFill>
+          <a:ln>
+            <a:noFill/>
+          </a:ln>
+        </p:spPr>
+        <p:style>
+          <a:lnRef idx="1">
+            <a:schemeClr val="accent1"/>
+          </a:lnRef>
+          <a:fillRef idx="3">
+            <a:schemeClr val="accent1"/>
+          </a:fillRef>
+          <a:effectRef idx="2">
+            <a:schemeClr val="accent1"/>
+          </a:effectRef>
+          <a:fontRef idx="minor">
+            <a:schemeClr val="lt1"/>
+          </a:fontRef>
+        </p:style>
+        <p:txBody>
+          <a:bodyPr rtlCol="0" anchor="ctr"/>
+          <a:lstStyle/>
+          <a:p>
+            <a:pPr algn="ctr"/>
+            <a:r>
+              <a:rPr lang="en-US" sz="1200" dirty="0" smtClean="0">
+                <a:solidFill>
+                  <a:srgbClr val="000000"/>
+                </a:solidFill>
+              </a:rPr>
+              <a:t>Kitty Graphic</a:t>
+            </a:r>
+            <a:endParaRPr lang="en-US" sz="1200" dirty="0">
+              <a:solidFill>
+                <a:srgbClr val="000000"/>
+              </a:solidFill>
+            </a:endParaRPr>
+          </a:p>
+        </p:txBody>
+      </p:sp>
+      <p:sp>
+        <p:nvSpPr>
+          <p:cNvPr id="19" name="Rectangle 18"/>
+          <p:cNvSpPr/>
+          <p:nvPr/>
+        </p:nvSpPr>
+        <p:spPr>
+          <a:xfrm>
+            <a:off x="5238041" y="1824693"/>
+            <a:ext cx="1221099" cy="260482"/>
+          </a:xfrm>
+          <a:prstGeom prst="rect">
+            <a:avLst/>
+          </a:prstGeom>
+          <a:solidFill>
+            <a:schemeClr val="accent6">
+              <a:lumMod val="60000"/>
+              <a:lumOff val="40000"/>
+            </a:schemeClr>
+          </a:solidFill>
+          <a:ln>
+            <a:noFill/>
+          </a:ln>
+        </p:spPr>
+        <p:style>
+          <a:lnRef idx="1">
+            <a:schemeClr val="accent1"/>
+          </a:lnRef>
+          <a:fillRef idx="3">
+            <a:schemeClr val="accent1"/>
+          </a:fillRef>
+          <a:effectRef idx="2">
+            <a:schemeClr val="accent1"/>
+          </a:effectRef>
+          <a:fontRef idx="minor">
+            <a:schemeClr val="lt1"/>
+          </a:fontRef>
+        </p:style>
+        <p:txBody>
+          <a:bodyPr rtlCol="0" anchor="ctr"/>
+          <a:lstStyle/>
+          <a:p>
+            <a:pPr algn="ctr"/>
+            <a:r>
+              <a:rPr lang="en-US" sz="1200" dirty="0" smtClean="0">
+                <a:solidFill>
+                  <a:srgbClr val="000000"/>
+                </a:solidFill>
+              </a:rPr>
+              <a:t>Kitty Graphic</a:t>
+            </a:r>
+            <a:endParaRPr lang="en-US" sz="1200" dirty="0">
+              <a:solidFill>
+                <a:srgbClr val="000000"/>
+              </a:solidFill>
+            </a:endParaRPr>
+          </a:p>
+        </p:txBody>
+      </p:sp>
+      <p:sp>
+        <p:nvSpPr>
+          <p:cNvPr id="20" name="Rectangle 19"/>
+          <p:cNvSpPr/>
+          <p:nvPr/>
+        </p:nvSpPr>
+        <p:spPr>
+          <a:xfrm>
+            <a:off x="5238041" y="2237575"/>
+            <a:ext cx="1221099" cy="260482"/>
+          </a:xfrm>
+          <a:prstGeom prst="rect">
+            <a:avLst/>
+          </a:prstGeom>
+          <a:solidFill>
+            <a:schemeClr val="accent6">
+              <a:lumMod val="60000"/>
+              <a:lumOff val="40000"/>
+            </a:schemeClr>
+          </a:solidFill>
+          <a:ln>
+            <a:noFill/>
+          </a:ln>
+        </p:spPr>
+        <p:style>
+          <a:lnRef idx="1">
+            <a:schemeClr val="accent1"/>
+          </a:lnRef>
+          <a:fillRef idx="3">
+            <a:schemeClr val="accent1"/>
+          </a:fillRef>
+          <a:effectRef idx="2">
+            <a:schemeClr val="accent1"/>
+          </a:effectRef>
+          <a:fontRef idx="minor">
+            <a:schemeClr val="lt1"/>
+          </a:fontRef>
+        </p:style>
+        <p:txBody>
+          <a:bodyPr rtlCol="0" anchor="ctr"/>
+          <a:lstStyle/>
+          <a:p>
+            <a:pPr algn="ctr"/>
+            <a:r>
+              <a:rPr lang="en-US" sz="1200" dirty="0" smtClean="0">
+                <a:solidFill>
+                  <a:srgbClr val="000000"/>
+                </a:solidFill>
+              </a:rPr>
+              <a:t>Kitty Graphic</a:t>
+            </a:r>
+            <a:endParaRPr lang="en-US" sz="1200" dirty="0">
+              <a:solidFill>
+                <a:srgbClr val="000000"/>
+              </a:solidFill>
+            </a:endParaRPr>
+          </a:p>
+        </p:txBody>
+      </p:sp>
+      <p:sp>
+        <p:nvSpPr>
+          <p:cNvPr id="21" name="Rectangle 20"/>
+          <p:cNvSpPr/>
+          <p:nvPr/>
+        </p:nvSpPr>
+        <p:spPr>
+          <a:xfrm>
+            <a:off x="5238041" y="2679688"/>
+            <a:ext cx="1221099" cy="260482"/>
+          </a:xfrm>
+          <a:prstGeom prst="rect">
+            <a:avLst/>
+          </a:prstGeom>
+          <a:solidFill>
+            <a:schemeClr val="accent6">
+              <a:lumMod val="60000"/>
+              <a:lumOff val="40000"/>
+            </a:schemeClr>
+          </a:solidFill>
+          <a:ln>
+            <a:noFill/>
+          </a:ln>
+        </p:spPr>
+        <p:style>
+          <a:lnRef idx="1">
+            <a:schemeClr val="accent1"/>
+          </a:lnRef>
+          <a:fillRef idx="3">
+            <a:schemeClr val="accent1"/>
+          </a:fillRef>
+          <a:effectRef idx="2">
+            <a:schemeClr val="accent1"/>
+          </a:effectRef>
+          <a:fontRef idx="minor">
+            <a:schemeClr val="lt1"/>
+          </a:fontRef>
+        </p:style>
+        <p:txBody>
+          <a:bodyPr rtlCol="0" anchor="ctr"/>
+          <a:lstStyle/>
+          <a:p>
+            <a:pPr algn="ctr"/>
+            <a:r>
+              <a:rPr lang="en-US" sz="1200" dirty="0" smtClean="0">
+                <a:solidFill>
+                  <a:srgbClr val="000000"/>
+                </a:solidFill>
+              </a:rPr>
+              <a:t>Kitty Graphic</a:t>
+            </a:r>
+            <a:endParaRPr lang="en-US" sz="1200" dirty="0">
+              <a:solidFill>
+                <a:srgbClr val="000000"/>
+              </a:solidFill>
+            </a:endParaRPr>
+          </a:p>
+        </p:txBody>
+      </p:sp>
+      <p:sp>
+        <p:nvSpPr>
+          <p:cNvPr id="22" name="Rectangle 21"/>
+          <p:cNvSpPr/>
+          <p:nvPr/>
+        </p:nvSpPr>
+        <p:spPr>
+          <a:xfrm>
+            <a:off x="6741791" y="1400090"/>
+            <a:ext cx="1221099" cy="260482"/>
+          </a:xfrm>
+          <a:prstGeom prst="rect">
+            <a:avLst/>
+          </a:prstGeom>
+          <a:solidFill>
+            <a:schemeClr val="accent6">
+              <a:lumMod val="60000"/>
+              <a:lumOff val="40000"/>
+            </a:schemeClr>
+          </a:solidFill>
+          <a:ln>
+            <a:noFill/>
+          </a:ln>
+        </p:spPr>
+        <p:style>
+          <a:lnRef idx="1">
+            <a:schemeClr val="accent1"/>
+          </a:lnRef>
+          <a:fillRef idx="3">
+            <a:schemeClr val="accent1"/>
+          </a:fillRef>
+          <a:effectRef idx="2">
+            <a:schemeClr val="accent1"/>
+          </a:effectRef>
+          <a:fontRef idx="minor">
+            <a:schemeClr val="lt1"/>
+          </a:fontRef>
+        </p:style>
+        <p:txBody>
+          <a:bodyPr rtlCol="0" anchor="ctr"/>
+          <a:lstStyle/>
+          <a:p>
+            <a:pPr algn="ctr"/>
+            <a:r>
+              <a:rPr lang="en-US" sz="1200" dirty="0" smtClean="0">
+                <a:solidFill>
+                  <a:srgbClr val="000000"/>
+                </a:solidFill>
+              </a:rPr>
+              <a:t>Kitty Graphic</a:t>
+            </a:r>
+            <a:endParaRPr lang="en-US" sz="1200" dirty="0">
+              <a:solidFill>
+                <a:srgbClr val="000000"/>
+              </a:solidFill>
+            </a:endParaRPr>
+          </a:p>
+        </p:txBody>
+      </p:sp>
+      <p:sp>
+        <p:nvSpPr>
+          <p:cNvPr id="23" name="Rectangle 22"/>
+          <p:cNvSpPr/>
+          <p:nvPr/>
+        </p:nvSpPr>
+        <p:spPr>
+          <a:xfrm>
+            <a:off x="6741791" y="1812972"/>
+            <a:ext cx="1221099" cy="260482"/>
+          </a:xfrm>
+          <a:prstGeom prst="rect">
+            <a:avLst/>
+          </a:prstGeom>
+          <a:solidFill>
+            <a:schemeClr val="accent6">
+              <a:lumMod val="60000"/>
+              <a:lumOff val="40000"/>
+            </a:schemeClr>
+          </a:solidFill>
+          <a:ln>
+            <a:noFill/>
+          </a:ln>
+        </p:spPr>
+        <p:style>
+          <a:lnRef idx="1">
+            <a:schemeClr val="accent1"/>
+          </a:lnRef>
+          <a:fillRef idx="3">
+            <a:schemeClr val="accent1"/>
+          </a:fillRef>
+          <a:effectRef idx="2">
+            <a:schemeClr val="accent1"/>
+          </a:effectRef>
+          <a:fontRef idx="minor">
+            <a:schemeClr val="lt1"/>
+          </a:fontRef>
+        </p:style>
+        <p:txBody>
+          <a:bodyPr rtlCol="0" anchor="ctr"/>
+          <a:lstStyle/>
+          <a:p>
+            <a:pPr algn="ctr"/>
+            <a:r>
+              <a:rPr lang="en-US" sz="1200" dirty="0" smtClean="0">
+                <a:solidFill>
+                  <a:srgbClr val="000000"/>
+                </a:solidFill>
+              </a:rPr>
+              <a:t>Kitty Graphic</a:t>
+            </a:r>
+            <a:endParaRPr lang="en-US" sz="1200" dirty="0">
+              <a:solidFill>
+                <a:srgbClr val="000000"/>
+              </a:solidFill>
+            </a:endParaRPr>
+          </a:p>
+        </p:txBody>
+      </p:sp>
+      <p:sp>
+        <p:nvSpPr>
+          <p:cNvPr id="24" name="Rectangle 23"/>
+          <p:cNvSpPr/>
+          <p:nvPr/>
+        </p:nvSpPr>
+        <p:spPr>
+          <a:xfrm>
+            <a:off x="6741791" y="2225854"/>
+            <a:ext cx="1221099" cy="260482"/>
+          </a:xfrm>
+          <a:prstGeom prst="rect">
+            <a:avLst/>
+          </a:prstGeom>
+          <a:solidFill>
+            <a:schemeClr val="accent6">
+              <a:lumMod val="60000"/>
+              <a:lumOff val="40000"/>
+            </a:schemeClr>
+          </a:solidFill>
+          <a:ln>
+            <a:noFill/>
+          </a:ln>
+        </p:spPr>
+        <p:style>
+          <a:lnRef idx="1">
+            <a:schemeClr val="accent1"/>
+          </a:lnRef>
+          <a:fillRef idx="3">
+            <a:schemeClr val="accent1"/>
+          </a:fillRef>
+          <a:effectRef idx="2">
+            <a:schemeClr val="accent1"/>
+          </a:effectRef>
+          <a:fontRef idx="minor">
+            <a:schemeClr val="lt1"/>
+          </a:fontRef>
+        </p:style>
+        <p:txBody>
+          <a:bodyPr rtlCol="0" anchor="ctr"/>
+          <a:lstStyle/>
+          <a:p>
+            <a:pPr algn="ctr"/>
+            <a:r>
+              <a:rPr lang="en-US" sz="1200" dirty="0" smtClean="0">
+                <a:solidFill>
+                  <a:srgbClr val="000000"/>
+                </a:solidFill>
+              </a:rPr>
+              <a:t>Kitty Graphic</a:t>
+            </a:r>
+            <a:endParaRPr lang="en-US" sz="1200" dirty="0">
+              <a:solidFill>
+                <a:srgbClr val="000000"/>
+              </a:solidFill>
+            </a:endParaRPr>
+          </a:p>
+        </p:txBody>
+      </p:sp>
+      <p:sp>
+        <p:nvSpPr>
+          <p:cNvPr id="25" name="Rectangle 24"/>
+          <p:cNvSpPr/>
+          <p:nvPr/>
+        </p:nvSpPr>
+        <p:spPr>
+          <a:xfrm>
+            <a:off x="6741791" y="2667967"/>
+            <a:ext cx="1221099" cy="260482"/>
+          </a:xfrm>
+          <a:prstGeom prst="rect">
+            <a:avLst/>
+          </a:prstGeom>
+          <a:solidFill>
+            <a:schemeClr val="accent6">
+              <a:lumMod val="60000"/>
+              <a:lumOff val="40000"/>
+            </a:schemeClr>
+          </a:solidFill>
+          <a:ln>
+            <a:noFill/>
+          </a:ln>
+        </p:spPr>
+        <p:style>
+          <a:lnRef idx="1">
+            <a:schemeClr val="accent1"/>
+          </a:lnRef>
+          <a:fillRef idx="3">
+            <a:schemeClr val="accent1"/>
+          </a:fillRef>
+          <a:effectRef idx="2">
+            <a:schemeClr val="accent1"/>
+          </a:effectRef>
+          <a:fontRef idx="minor">
+            <a:schemeClr val="lt1"/>
+          </a:fontRef>
+        </p:style>
+        <p:txBody>
+          <a:bodyPr rtlCol="0" anchor="ctr"/>
+          <a:lstStyle/>
+          <a:p>
+            <a:pPr algn="ctr"/>
+            <a:r>
+              <a:rPr lang="en-US" sz="1200" dirty="0" smtClean="0">
+                <a:solidFill>
+                  <a:srgbClr val="000000"/>
+                </a:solidFill>
+              </a:rPr>
+              <a:t>Kitty Graphic</a:t>
+            </a:r>
+            <a:endParaRPr lang="en-US" sz="1200" dirty="0">
+              <a:solidFill>
+                <a:srgbClr val="000000"/>
+              </a:solidFill>
+            </a:endParaRPr>
+          </a:p>
+        </p:txBody>
+      </p:sp>
+      <p:pic>
+        <p:nvPicPr>
+          <p:cNvPr id="37" name="Picture 36"/>
+          <p:cNvPicPr>
+            <a:picLocks noChangeAspect="1"/>
+          </p:cNvPicPr>
+          <p:nvPr/>
+        </p:nvPicPr>
+        <p:blipFill rotWithShape="1">
+          <a:blip r:embed="rId2"/>
+          <a:srcRect t="55455" r="26118"/>
+          <a:stretch/>
+        </p:blipFill>
+        <p:spPr>
+          <a:xfrm>
+            <a:off x="4672742" y="5534713"/>
+            <a:ext cx="4119176" cy="928494"/>
+          </a:xfrm>
+          <a:prstGeom prst="rect">
+            <a:avLst/>
+          </a:prstGeom>
+        </p:spPr>
+      </p:pic>
+      <p:pic>
+        <p:nvPicPr>
+          <p:cNvPr id="36" name="Picture 35"/>
+          <p:cNvPicPr>
+            <a:picLocks noChangeAspect="1"/>
+          </p:cNvPicPr>
+          <p:nvPr/>
+        </p:nvPicPr>
+        <p:blipFill rotWithShape="1">
+          <a:blip r:embed="rId2"/>
+          <a:srcRect t="55455" r="22258"/>
+          <a:stretch/>
+        </p:blipFill>
+        <p:spPr>
+          <a:xfrm>
+            <a:off x="338370" y="5534950"/>
+            <a:ext cx="4334371" cy="928494"/>
+          </a:xfrm>
+          <a:prstGeom prst="rect">
+            <a:avLst/>
+          </a:prstGeom>
+        </p:spPr>
+      </p:pic>
+      <p:pic>
+        <p:nvPicPr>
+          <p:cNvPr id="27" name="Picture 26"/>
+          <p:cNvPicPr>
+            <a:picLocks noChangeAspect="1"/>
+          </p:cNvPicPr>
+          <p:nvPr/>
+        </p:nvPicPr>
+        <p:blipFill>
+          <a:blip r:embed="rId3">
+            <a:extLst>
+              <a:ext uri="{BEBA8EAE-BF5A-486C-A8C5-ECC9F3942E4B}">
+                <a14:imgProps xmlns:a14="http://schemas.microsoft.com/office/drawing/2010/main">
+                  <a14:imgLayer r:embed="rId4">
+                    <a14:imgEffect>
+                      <a14:backgroundRemoval t="9794" b="89691" l="5792" r="94788"/>
+                    </a14:imgEffect>
+                  </a14:imgLayer>
+                </a14:imgProps>
+              </a:ext>
+            </a:extLst>
+          </a:blip>
+          <a:stretch>
+            <a:fillRect/>
+          </a:stretch>
+        </p:blipFill>
+        <p:spPr>
+          <a:xfrm>
+            <a:off x="3647092" y="5405000"/>
+            <a:ext cx="1635247" cy="771264"/>
+          </a:xfrm>
+          <a:prstGeom prst="rect">
+            <a:avLst/>
+          </a:prstGeom>
+        </p:spPr>
+      </p:pic>
+      <p:pic>
+        <p:nvPicPr>
+          <p:cNvPr id="28" name="Picture 27"/>
+          <p:cNvPicPr>
+            <a:picLocks noChangeAspect="1"/>
+          </p:cNvPicPr>
+          <p:nvPr/>
+        </p:nvPicPr>
+        <p:blipFill>
+          <a:blip r:embed="rId5">
+            <a:extLst>
+              <a:ext uri="{BEBA8EAE-BF5A-486C-A8C5-ECC9F3942E4B}">
+                <a14:imgProps xmlns:a14="http://schemas.microsoft.com/office/drawing/2010/main">
+                  <a14:imgLayer r:embed="rId6">
+                    <a14:imgEffect>
+                      <a14:backgroundRemoval t="5667" b="95667" l="5167" r="93000"/>
+                    </a14:imgEffect>
+                  </a14:imgLayer>
+                </a14:imgProps>
+              </a:ext>
+            </a:extLst>
+          </a:blip>
+          <a:stretch>
+            <a:fillRect/>
+          </a:stretch>
+        </p:blipFill>
+        <p:spPr>
+          <a:xfrm>
+            <a:off x="6070377" y="4566273"/>
+            <a:ext cx="307357" cy="307357"/>
+          </a:xfrm>
+          <a:prstGeom prst="rect">
+            <a:avLst/>
+          </a:prstGeom>
+        </p:spPr>
+      </p:pic>
+      <p:cxnSp>
+        <p:nvCxnSpPr>
+          <p:cNvPr id="30" name="Straight Arrow Connector 29"/>
+          <p:cNvCxnSpPr/>
+          <p:nvPr/>
+        </p:nvCxnSpPr>
+        <p:spPr>
+          <a:xfrm>
+            <a:off x="1481589" y="3304864"/>
+            <a:ext cx="0" cy="618645"/>
+          </a:xfrm>
+          <a:prstGeom prst="straightConnector1">
+            <a:avLst/>
+          </a:prstGeom>
+          <a:ln>
+            <a:tailEnd type="arrow"/>
+          </a:ln>
+        </p:spPr>
+        <p:style>
+          <a:lnRef idx="2">
+            <a:schemeClr val="dk1"/>
+          </a:lnRef>
+          <a:fillRef idx="0">
+            <a:schemeClr val="dk1"/>
+          </a:fillRef>
+          <a:effectRef idx="1">
+            <a:schemeClr val="dk1"/>
+          </a:effectRef>
+          <a:fontRef idx="minor">
+            <a:schemeClr val="tx1"/>
+          </a:fontRef>
+        </p:style>
+      </p:cxnSp>
+      <p:cxnSp>
+        <p:nvCxnSpPr>
+          <p:cNvPr id="31" name="Straight Arrow Connector 30"/>
+          <p:cNvCxnSpPr/>
+          <p:nvPr/>
+        </p:nvCxnSpPr>
+        <p:spPr>
+          <a:xfrm>
+            <a:off x="2952785" y="3304864"/>
+            <a:ext cx="0" cy="618645"/>
+          </a:xfrm>
+          <a:prstGeom prst="straightConnector1">
+            <a:avLst/>
+          </a:prstGeom>
+          <a:ln>
+            <a:tailEnd type="arrow"/>
+          </a:ln>
+        </p:spPr>
+        <p:style>
+          <a:lnRef idx="2">
+            <a:schemeClr val="dk1"/>
+          </a:lnRef>
+          <a:fillRef idx="0">
+            <a:schemeClr val="dk1"/>
+          </a:fillRef>
+          <a:effectRef idx="1">
+            <a:schemeClr val="dk1"/>
+          </a:effectRef>
+          <a:fontRef idx="minor">
+            <a:schemeClr val="tx1"/>
+          </a:fontRef>
+        </p:style>
+      </p:cxnSp>
+      <p:cxnSp>
+        <p:nvCxnSpPr>
+          <p:cNvPr id="32" name="Straight Arrow Connector 31"/>
+          <p:cNvCxnSpPr/>
+          <p:nvPr/>
+        </p:nvCxnSpPr>
+        <p:spPr>
+          <a:xfrm>
+            <a:off x="4418096" y="3304864"/>
+            <a:ext cx="0" cy="618645"/>
+          </a:xfrm>
+          <a:prstGeom prst="straightConnector1">
+            <a:avLst/>
+          </a:prstGeom>
+          <a:ln>
+            <a:tailEnd type="arrow"/>
+          </a:ln>
+        </p:spPr>
+        <p:style>
+          <a:lnRef idx="2">
+            <a:schemeClr val="dk1"/>
+          </a:lnRef>
+          <a:fillRef idx="0">
+            <a:schemeClr val="dk1"/>
+          </a:fillRef>
+          <a:effectRef idx="1">
+            <a:schemeClr val="dk1"/>
+          </a:effectRef>
+          <a:fontRef idx="minor">
+            <a:schemeClr val="tx1"/>
+          </a:fontRef>
+        </p:style>
+      </p:cxnSp>
+      <p:cxnSp>
+        <p:nvCxnSpPr>
+          <p:cNvPr id="33" name="Straight Arrow Connector 32"/>
+          <p:cNvCxnSpPr/>
+          <p:nvPr/>
+        </p:nvCxnSpPr>
+        <p:spPr>
+          <a:xfrm>
+            <a:off x="5889292" y="3304864"/>
+            <a:ext cx="0" cy="618645"/>
+          </a:xfrm>
+          <a:prstGeom prst="straightConnector1">
+            <a:avLst/>
+          </a:prstGeom>
+          <a:ln>
+            <a:tailEnd type="arrow"/>
+          </a:ln>
+        </p:spPr>
+        <p:style>
+          <a:lnRef idx="2">
+            <a:schemeClr val="dk1"/>
+          </a:lnRef>
+          <a:fillRef idx="0">
+            <a:schemeClr val="dk1"/>
+          </a:fillRef>
+          <a:effectRef idx="1">
+            <a:schemeClr val="dk1"/>
+          </a:effectRef>
+          <a:fontRef idx="minor">
+            <a:schemeClr val="tx1"/>
+          </a:fontRef>
+        </p:style>
+      </p:cxnSp>
+      <p:cxnSp>
+        <p:nvCxnSpPr>
+          <p:cNvPr id="34" name="Straight Arrow Connector 33"/>
+          <p:cNvCxnSpPr/>
+          <p:nvPr/>
+        </p:nvCxnSpPr>
+        <p:spPr>
+          <a:xfrm>
+            <a:off x="7344198" y="3304864"/>
+            <a:ext cx="0" cy="618645"/>
+          </a:xfrm>
+          <a:prstGeom prst="straightConnector1">
+            <a:avLst/>
+          </a:prstGeom>
+          <a:ln>
+            <a:tailEnd type="arrow"/>
+          </a:ln>
+        </p:spPr>
+        <p:style>
+          <a:lnRef idx="2">
+            <a:schemeClr val="dk1"/>
+          </a:lnRef>
+          <a:fillRef idx="0">
+            <a:schemeClr val="dk1"/>
+          </a:fillRef>
+          <a:effectRef idx="1">
+            <a:schemeClr val="dk1"/>
+          </a:effectRef>
+          <a:fontRef idx="minor">
+            <a:schemeClr val="tx1"/>
+          </a:fontRef>
+        </p:style>
+      </p:cxnSp>
+      <p:sp>
+        <p:nvSpPr>
+          <p:cNvPr id="35" name="TextBox 34"/>
+          <p:cNvSpPr txBox="1"/>
+          <p:nvPr/>
+        </p:nvSpPr>
+        <p:spPr>
+          <a:xfrm>
+            <a:off x="2740458" y="3991065"/>
+            <a:ext cx="3355275" cy="307777"/>
+          </a:xfrm>
+          <a:prstGeom prst="rect">
+            <a:avLst/>
+          </a:prstGeom>
+          <a:noFill/>
+        </p:spPr>
+        <p:txBody>
+          <a:bodyPr wrap="square" rtlCol="0">
+            <a:spAutoFit/>
+          </a:bodyPr>
+          <a:lstStyle/>
+          <a:p>
+            <a:pPr algn="ctr"/>
+            <a:r>
+              <a:rPr lang="en-US" sz="1400" dirty="0" smtClean="0">
+                <a:latin typeface="Helvetica"/>
+                <a:cs typeface="Helvetica"/>
+              </a:rPr>
+              <a:t>Kitties move down every x seconds</a:t>
+            </a:r>
+            <a:endParaRPr lang="en-US" sz="1400" dirty="0">
+              <a:latin typeface="Helvetica"/>
+              <a:cs typeface="Helvetica"/>
+            </a:endParaRPr>
+          </a:p>
+        </p:txBody>
+      </p:sp>
+      <p:sp>
+        <p:nvSpPr>
+          <p:cNvPr id="38" name="TextBox 37"/>
+          <p:cNvSpPr txBox="1"/>
+          <p:nvPr/>
+        </p:nvSpPr>
+        <p:spPr>
+          <a:xfrm>
+            <a:off x="358195" y="5209638"/>
+            <a:ext cx="4477359" cy="307777"/>
+          </a:xfrm>
+          <a:prstGeom prst="rect">
+            <a:avLst/>
+          </a:prstGeom>
+          <a:noFill/>
+        </p:spPr>
+        <p:txBody>
+          <a:bodyPr wrap="square" rtlCol="0">
+            <a:spAutoFit/>
+          </a:bodyPr>
+          <a:lstStyle/>
+          <a:p>
+            <a:r>
+              <a:rPr lang="en-US" sz="1400" dirty="0" smtClean="0">
+                <a:latin typeface="Helvetica"/>
+                <a:cs typeface="Helvetica"/>
+              </a:rPr>
+              <a:t>Don’t let the kitties reach the fence!</a:t>
+            </a:r>
+            <a:endParaRPr lang="en-US" sz="1400" dirty="0">
+              <a:latin typeface="Helvetica"/>
+              <a:cs typeface="Helvetica"/>
+            </a:endParaRPr>
+          </a:p>
+        </p:txBody>
+      </p:sp>
+    </p:spTree>
+    <p:extLst>
+      <p:ext uri="{BB962C8B-B14F-4D97-AF65-F5344CB8AC3E}">
+        <p14:creationId xmlns:p14="http://schemas.microsoft.com/office/powerpoint/2010/main" val="2729354336"/>
+      </p:ext>
+    </p:extLst>
+  </p:cSld>
+  <p:clrMapOvr>
+    <a:masterClrMapping/>
+  </p:clrMapOvr>
+  <p:timing>
+    <p:tnLst>
+      <p:par>
+        <p:cTn xmlns:p14="http://schemas.microsoft.com/office/powerpoint/2010/main" id="1" dur="indefinite" restart="never" nodeType="tmRoot"/>
+      </p:par>
+    </p:tnLst>
+  </p:timing>
+</p:sld>
+</file>
+
+<file path=ppt/slides/slide2.xml><?xml version="1.0" encoding="utf-8"?>
 <p:sld xmlns:a="http://schemas.openxmlformats.org/drawingml/2006/main" xmlns:r="http://schemas.openxmlformats.org/officeDocument/2006/relationships" xmlns:p="http://schemas.openxmlformats.org/presentationml/2006/main">
   <p:cSld>
     <p:spTree>
@@ -3533,46 +5251,14 @@
         </p:cxnSp>
         <p:cxnSp>
           <p:nvCxnSpPr>
-            <p:cNvPr id="15" name="Straight Connector 14"/>
-            <p:cNvCxnSpPr>
-              <a:endCxn id="7" idx="3"/>
-            </p:cNvCxnSpPr>
-            <p:nvPr/>
-          </p:nvCxnSpPr>
-          <p:spPr>
-            <a:xfrm flipH="1" flipV="1">
-              <a:off x="3012605" y="2036889"/>
-              <a:ext cx="1256215" cy="2431"/>
-            </a:xfrm>
-            <a:prstGeom prst="line">
-              <a:avLst/>
-            </a:prstGeom>
-          </p:spPr>
-          <p:style>
-            <a:lnRef idx="2">
-              <a:schemeClr val="dk1"/>
-            </a:lnRef>
-            <a:fillRef idx="0">
-              <a:schemeClr val="dk1"/>
-            </a:fillRef>
-            <a:effectRef idx="1">
-              <a:schemeClr val="dk1"/>
-            </a:effectRef>
-            <a:fontRef idx="minor">
-              <a:schemeClr val="tx1"/>
-            </a:fontRef>
-          </p:style>
-        </p:cxnSp>
-        <p:cxnSp>
-          <p:nvCxnSpPr>
             <p:cNvPr id="23" name="Straight Connector 22"/>
             <p:cNvCxnSpPr/>
             <p:nvPr/>
           </p:nvCxnSpPr>
           <p:spPr>
             <a:xfrm flipH="1" flipV="1">
-              <a:off x="4268821" y="2034459"/>
-              <a:ext cx="1214109" cy="2430"/>
+              <a:off x="3012605" y="2034459"/>
+              <a:ext cx="2470326" cy="2430"/>
             </a:xfrm>
             <a:prstGeom prst="line">
               <a:avLst/>
@@ -4896,1724 +6582,6 @@
 </p:sld>
 </file>
 
-<file path=ppt/slides/slide2.xml><?xml version="1.0" encoding="utf-8"?>
-<p:sld xmlns:a="http://schemas.openxmlformats.org/drawingml/2006/main" xmlns:r="http://schemas.openxmlformats.org/officeDocument/2006/relationships" xmlns:p="http://schemas.openxmlformats.org/presentationml/2006/main">
-  <p:cSld>
-    <p:spTree>
-      <p:nvGrpSpPr>
-        <p:cNvPr id="1" name=""/>
-        <p:cNvGrpSpPr/>
-        <p:nvPr/>
-      </p:nvGrpSpPr>
-      <p:grpSpPr>
-        <a:xfrm>
-          <a:off x="0" y="0"/>
-          <a:ext cx="0" cy="0"/>
-          <a:chOff x="0" y="0"/>
-          <a:chExt cx="0" cy="0"/>
-        </a:xfrm>
-      </p:grpSpPr>
-      <p:sp>
-        <p:nvSpPr>
-          <p:cNvPr id="26" name="Rectangle 25"/>
-          <p:cNvSpPr/>
-          <p:nvPr/>
-        </p:nvSpPr>
-        <p:spPr>
-          <a:xfrm>
-            <a:off x="341914" y="751145"/>
-            <a:ext cx="8450003" cy="5712062"/>
-          </a:xfrm>
-          <a:prstGeom prst="rect">
-            <a:avLst/>
-          </a:prstGeom>
-          <a:solidFill>
-            <a:schemeClr val="bg1">
-              <a:lumMod val="85000"/>
-              <a:alpha val="23000"/>
-            </a:schemeClr>
-          </a:solidFill>
-          <a:ln>
-            <a:noFill/>
-          </a:ln>
-        </p:spPr>
-        <p:style>
-          <a:lnRef idx="1">
-            <a:schemeClr val="accent1"/>
-          </a:lnRef>
-          <a:fillRef idx="3">
-            <a:schemeClr val="accent1"/>
-          </a:fillRef>
-          <a:effectRef idx="2">
-            <a:schemeClr val="accent1"/>
-          </a:effectRef>
-          <a:fontRef idx="minor">
-            <a:schemeClr val="lt1"/>
-          </a:fontRef>
-        </p:style>
-        <p:txBody>
-          <a:bodyPr rtlCol="0" anchor="ctr"/>
-          <a:lstStyle/>
-          <a:p>
-            <a:pPr algn="ctr"/>
-            <a:endParaRPr lang="en-US"/>
-          </a:p>
-        </p:txBody>
-      </p:sp>
-      <p:sp>
-        <p:nvSpPr>
-          <p:cNvPr id="4" name="TextBox 3"/>
-          <p:cNvSpPr txBox="1"/>
-          <p:nvPr/>
-        </p:nvSpPr>
-        <p:spPr>
-          <a:xfrm>
-            <a:off x="358195" y="211645"/>
-            <a:ext cx="2767825" cy="523220"/>
-          </a:xfrm>
-          <a:prstGeom prst="rect">
-            <a:avLst/>
-          </a:prstGeom>
-          <a:noFill/>
-        </p:spPr>
-        <p:txBody>
-          <a:bodyPr wrap="square" rtlCol="0">
-            <a:spAutoFit/>
-          </a:bodyPr>
-          <a:lstStyle/>
-          <a:p>
-            <a:r>
-              <a:rPr lang="en-US" sz="2800" dirty="0" smtClean="0">
-                <a:latin typeface="Avenir Black"/>
-                <a:cs typeface="Avenir Black"/>
-              </a:rPr>
-              <a:t>Wireframe</a:t>
-            </a:r>
-            <a:endParaRPr lang="en-US" sz="2800" dirty="0">
-              <a:latin typeface="Avenir Black"/>
-              <a:cs typeface="Avenir Black"/>
-            </a:endParaRPr>
-          </a:p>
-        </p:txBody>
-      </p:sp>
-      <p:sp>
-        <p:nvSpPr>
-          <p:cNvPr id="3" name="TextBox 2"/>
-          <p:cNvSpPr txBox="1"/>
-          <p:nvPr/>
-        </p:nvSpPr>
-        <p:spPr>
-          <a:xfrm>
-            <a:off x="3760986" y="6463444"/>
-            <a:ext cx="1790946" cy="276999"/>
-          </a:xfrm>
-          <a:prstGeom prst="rect">
-            <a:avLst/>
-          </a:prstGeom>
-          <a:noFill/>
-        </p:spPr>
-        <p:txBody>
-          <a:bodyPr wrap="square" rtlCol="0">
-            <a:spAutoFit/>
-          </a:bodyPr>
-          <a:lstStyle/>
-          <a:p>
-            <a:pPr algn="ctr"/>
-            <a:r>
-              <a:rPr lang="en-US" sz="1200" dirty="0" smtClean="0"/>
-              <a:t>720px</a:t>
-            </a:r>
-            <a:endParaRPr lang="en-US" sz="1200" dirty="0"/>
-          </a:p>
-        </p:txBody>
-      </p:sp>
-      <p:sp>
-        <p:nvSpPr>
-          <p:cNvPr id="5" name="TextBox 4"/>
-          <p:cNvSpPr txBox="1"/>
-          <p:nvPr/>
-        </p:nvSpPr>
-        <p:spPr>
-          <a:xfrm rot="16200000">
-            <a:off x="8034944" y="3457501"/>
-            <a:ext cx="1790946" cy="276999"/>
-          </a:xfrm>
-          <a:prstGeom prst="rect">
-            <a:avLst/>
-          </a:prstGeom>
-          <a:noFill/>
-        </p:spPr>
-        <p:txBody>
-          <a:bodyPr wrap="square" rtlCol="0">
-            <a:spAutoFit/>
-          </a:bodyPr>
-          <a:lstStyle/>
-          <a:p>
-            <a:pPr algn="ctr"/>
-            <a:r>
-              <a:rPr lang="en-US" sz="1200" dirty="0" smtClean="0"/>
-              <a:t>480px</a:t>
-            </a:r>
-            <a:endParaRPr lang="en-US" sz="1200" dirty="0"/>
-          </a:p>
-        </p:txBody>
-      </p:sp>
-      <p:sp>
-        <p:nvSpPr>
-          <p:cNvPr id="6" name="Rectangle 5"/>
-          <p:cNvSpPr/>
-          <p:nvPr/>
-        </p:nvSpPr>
-        <p:spPr>
-          <a:xfrm>
-            <a:off x="895473" y="1400090"/>
-            <a:ext cx="1221099" cy="260482"/>
-          </a:xfrm>
-          <a:prstGeom prst="rect">
-            <a:avLst/>
-          </a:prstGeom>
-          <a:solidFill>
-            <a:schemeClr val="accent6">
-              <a:lumMod val="60000"/>
-              <a:lumOff val="40000"/>
-            </a:schemeClr>
-          </a:solidFill>
-          <a:ln>
-            <a:noFill/>
-          </a:ln>
-        </p:spPr>
-        <p:style>
-          <a:lnRef idx="1">
-            <a:schemeClr val="accent1"/>
-          </a:lnRef>
-          <a:fillRef idx="3">
-            <a:schemeClr val="accent1"/>
-          </a:fillRef>
-          <a:effectRef idx="2">
-            <a:schemeClr val="accent1"/>
-          </a:effectRef>
-          <a:fontRef idx="minor">
-            <a:schemeClr val="lt1"/>
-          </a:fontRef>
-        </p:style>
-        <p:txBody>
-          <a:bodyPr rtlCol="0" anchor="ctr"/>
-          <a:lstStyle/>
-          <a:p>
-            <a:pPr algn="ctr"/>
-            <a:r>
-              <a:rPr lang="en-US" sz="1200" dirty="0" smtClean="0">
-                <a:solidFill>
-                  <a:srgbClr val="000000"/>
-                </a:solidFill>
-              </a:rPr>
-              <a:t>Kitty Graphic</a:t>
-            </a:r>
-            <a:endParaRPr lang="en-US" sz="1200" dirty="0">
-              <a:solidFill>
-                <a:srgbClr val="000000"/>
-              </a:solidFill>
-            </a:endParaRPr>
-          </a:p>
-        </p:txBody>
-      </p:sp>
-      <p:sp>
-        <p:nvSpPr>
-          <p:cNvPr id="7" name="Rectangle 6"/>
-          <p:cNvSpPr/>
-          <p:nvPr/>
-        </p:nvSpPr>
-        <p:spPr>
-          <a:xfrm>
-            <a:off x="895473" y="1812972"/>
-            <a:ext cx="1221099" cy="260482"/>
-          </a:xfrm>
-          <a:prstGeom prst="rect">
-            <a:avLst/>
-          </a:prstGeom>
-          <a:solidFill>
-            <a:schemeClr val="accent6">
-              <a:lumMod val="60000"/>
-              <a:lumOff val="40000"/>
-            </a:schemeClr>
-          </a:solidFill>
-          <a:ln>
-            <a:noFill/>
-          </a:ln>
-        </p:spPr>
-        <p:style>
-          <a:lnRef idx="1">
-            <a:schemeClr val="accent1"/>
-          </a:lnRef>
-          <a:fillRef idx="3">
-            <a:schemeClr val="accent1"/>
-          </a:fillRef>
-          <a:effectRef idx="2">
-            <a:schemeClr val="accent1"/>
-          </a:effectRef>
-          <a:fontRef idx="minor">
-            <a:schemeClr val="lt1"/>
-          </a:fontRef>
-        </p:style>
-        <p:txBody>
-          <a:bodyPr rtlCol="0" anchor="ctr"/>
-          <a:lstStyle/>
-          <a:p>
-            <a:pPr algn="ctr"/>
-            <a:r>
-              <a:rPr lang="en-US" sz="1200" dirty="0" smtClean="0">
-                <a:solidFill>
-                  <a:srgbClr val="000000"/>
-                </a:solidFill>
-              </a:rPr>
-              <a:t>Kitty Graphic</a:t>
-            </a:r>
-            <a:endParaRPr lang="en-US" sz="1200" dirty="0">
-              <a:solidFill>
-                <a:srgbClr val="000000"/>
-              </a:solidFill>
-            </a:endParaRPr>
-          </a:p>
-        </p:txBody>
-      </p:sp>
-      <p:sp>
-        <p:nvSpPr>
-          <p:cNvPr id="8" name="Rectangle 7"/>
-          <p:cNvSpPr/>
-          <p:nvPr/>
-        </p:nvSpPr>
-        <p:spPr>
-          <a:xfrm>
-            <a:off x="895473" y="2225854"/>
-            <a:ext cx="1221099" cy="260482"/>
-          </a:xfrm>
-          <a:prstGeom prst="rect">
-            <a:avLst/>
-          </a:prstGeom>
-          <a:solidFill>
-            <a:schemeClr val="accent6">
-              <a:lumMod val="60000"/>
-              <a:lumOff val="40000"/>
-            </a:schemeClr>
-          </a:solidFill>
-          <a:ln>
-            <a:noFill/>
-          </a:ln>
-        </p:spPr>
-        <p:style>
-          <a:lnRef idx="1">
-            <a:schemeClr val="accent1"/>
-          </a:lnRef>
-          <a:fillRef idx="3">
-            <a:schemeClr val="accent1"/>
-          </a:fillRef>
-          <a:effectRef idx="2">
-            <a:schemeClr val="accent1"/>
-          </a:effectRef>
-          <a:fontRef idx="minor">
-            <a:schemeClr val="lt1"/>
-          </a:fontRef>
-        </p:style>
-        <p:txBody>
-          <a:bodyPr rtlCol="0" anchor="ctr"/>
-          <a:lstStyle/>
-          <a:p>
-            <a:pPr algn="ctr"/>
-            <a:r>
-              <a:rPr lang="en-US" sz="1200" dirty="0" smtClean="0">
-                <a:solidFill>
-                  <a:srgbClr val="000000"/>
-                </a:solidFill>
-              </a:rPr>
-              <a:t>Kitty Graphic</a:t>
-            </a:r>
-            <a:endParaRPr lang="en-US" sz="1200" dirty="0">
-              <a:solidFill>
-                <a:srgbClr val="000000"/>
-              </a:solidFill>
-            </a:endParaRPr>
-          </a:p>
-        </p:txBody>
-      </p:sp>
-      <p:sp>
-        <p:nvSpPr>
-          <p:cNvPr id="9" name="Rectangle 8"/>
-          <p:cNvSpPr/>
-          <p:nvPr/>
-        </p:nvSpPr>
-        <p:spPr>
-          <a:xfrm>
-            <a:off x="895473" y="2667967"/>
-            <a:ext cx="1221099" cy="260482"/>
-          </a:xfrm>
-          <a:prstGeom prst="rect">
-            <a:avLst/>
-          </a:prstGeom>
-          <a:solidFill>
-            <a:schemeClr val="accent6">
-              <a:lumMod val="60000"/>
-              <a:lumOff val="40000"/>
-            </a:schemeClr>
-          </a:solidFill>
-          <a:ln>
-            <a:noFill/>
-          </a:ln>
-        </p:spPr>
-        <p:style>
-          <a:lnRef idx="1">
-            <a:schemeClr val="accent1"/>
-          </a:lnRef>
-          <a:fillRef idx="3">
-            <a:schemeClr val="accent1"/>
-          </a:fillRef>
-          <a:effectRef idx="2">
-            <a:schemeClr val="accent1"/>
-          </a:effectRef>
-          <a:fontRef idx="minor">
-            <a:schemeClr val="lt1"/>
-          </a:fontRef>
-        </p:style>
-        <p:txBody>
-          <a:bodyPr rtlCol="0" anchor="ctr"/>
-          <a:lstStyle/>
-          <a:p>
-            <a:pPr algn="ctr"/>
-            <a:r>
-              <a:rPr lang="en-US" sz="1200" dirty="0" smtClean="0">
-                <a:solidFill>
-                  <a:srgbClr val="000000"/>
-                </a:solidFill>
-              </a:rPr>
-              <a:t>Kitty Graphic</a:t>
-            </a:r>
-            <a:endParaRPr lang="en-US" sz="1200" dirty="0">
-              <a:solidFill>
-                <a:srgbClr val="000000"/>
-              </a:solidFill>
-            </a:endParaRPr>
-          </a:p>
-        </p:txBody>
-      </p:sp>
-      <p:sp>
-        <p:nvSpPr>
-          <p:cNvPr id="10" name="Rectangle 9"/>
-          <p:cNvSpPr/>
-          <p:nvPr/>
-        </p:nvSpPr>
-        <p:spPr>
-          <a:xfrm>
-            <a:off x="2350378" y="1403997"/>
-            <a:ext cx="1221099" cy="260482"/>
-          </a:xfrm>
-          <a:prstGeom prst="rect">
-            <a:avLst/>
-          </a:prstGeom>
-          <a:solidFill>
-            <a:schemeClr val="accent6">
-              <a:lumMod val="60000"/>
-              <a:lumOff val="40000"/>
-            </a:schemeClr>
-          </a:solidFill>
-          <a:ln>
-            <a:noFill/>
-          </a:ln>
-        </p:spPr>
-        <p:style>
-          <a:lnRef idx="1">
-            <a:schemeClr val="accent1"/>
-          </a:lnRef>
-          <a:fillRef idx="3">
-            <a:schemeClr val="accent1"/>
-          </a:fillRef>
-          <a:effectRef idx="2">
-            <a:schemeClr val="accent1"/>
-          </a:effectRef>
-          <a:fontRef idx="minor">
-            <a:schemeClr val="lt1"/>
-          </a:fontRef>
-        </p:style>
-        <p:txBody>
-          <a:bodyPr rtlCol="0" anchor="ctr"/>
-          <a:lstStyle/>
-          <a:p>
-            <a:pPr algn="ctr"/>
-            <a:r>
-              <a:rPr lang="en-US" sz="1200" dirty="0" smtClean="0">
-                <a:solidFill>
-                  <a:srgbClr val="000000"/>
-                </a:solidFill>
-              </a:rPr>
-              <a:t>Kitty Graphic</a:t>
-            </a:r>
-            <a:endParaRPr lang="en-US" sz="1200" dirty="0">
-              <a:solidFill>
-                <a:srgbClr val="000000"/>
-              </a:solidFill>
-            </a:endParaRPr>
-          </a:p>
-        </p:txBody>
-      </p:sp>
-      <p:sp>
-        <p:nvSpPr>
-          <p:cNvPr id="11" name="Rectangle 10"/>
-          <p:cNvSpPr/>
-          <p:nvPr/>
-        </p:nvSpPr>
-        <p:spPr>
-          <a:xfrm>
-            <a:off x="2350378" y="1816879"/>
-            <a:ext cx="1221099" cy="260482"/>
-          </a:xfrm>
-          <a:prstGeom prst="rect">
-            <a:avLst/>
-          </a:prstGeom>
-          <a:solidFill>
-            <a:schemeClr val="accent6">
-              <a:lumMod val="60000"/>
-              <a:lumOff val="40000"/>
-            </a:schemeClr>
-          </a:solidFill>
-          <a:ln>
-            <a:noFill/>
-          </a:ln>
-        </p:spPr>
-        <p:style>
-          <a:lnRef idx="1">
-            <a:schemeClr val="accent1"/>
-          </a:lnRef>
-          <a:fillRef idx="3">
-            <a:schemeClr val="accent1"/>
-          </a:fillRef>
-          <a:effectRef idx="2">
-            <a:schemeClr val="accent1"/>
-          </a:effectRef>
-          <a:fontRef idx="minor">
-            <a:schemeClr val="lt1"/>
-          </a:fontRef>
-        </p:style>
-        <p:txBody>
-          <a:bodyPr rtlCol="0" anchor="ctr"/>
-          <a:lstStyle/>
-          <a:p>
-            <a:pPr algn="ctr"/>
-            <a:r>
-              <a:rPr lang="en-US" sz="1200" dirty="0" smtClean="0">
-                <a:solidFill>
-                  <a:srgbClr val="000000"/>
-                </a:solidFill>
-              </a:rPr>
-              <a:t>Kitty Graphic</a:t>
-            </a:r>
-            <a:endParaRPr lang="en-US" sz="1200" dirty="0">
-              <a:solidFill>
-                <a:srgbClr val="000000"/>
-              </a:solidFill>
-            </a:endParaRPr>
-          </a:p>
-        </p:txBody>
-      </p:sp>
-      <p:sp>
-        <p:nvSpPr>
-          <p:cNvPr id="12" name="Rectangle 11"/>
-          <p:cNvSpPr/>
-          <p:nvPr/>
-        </p:nvSpPr>
-        <p:spPr>
-          <a:xfrm>
-            <a:off x="2350378" y="2229761"/>
-            <a:ext cx="1221099" cy="260482"/>
-          </a:xfrm>
-          <a:prstGeom prst="rect">
-            <a:avLst/>
-          </a:prstGeom>
-          <a:solidFill>
-            <a:schemeClr val="accent6">
-              <a:lumMod val="60000"/>
-              <a:lumOff val="40000"/>
-            </a:schemeClr>
-          </a:solidFill>
-          <a:ln>
-            <a:noFill/>
-          </a:ln>
-        </p:spPr>
-        <p:style>
-          <a:lnRef idx="1">
-            <a:schemeClr val="accent1"/>
-          </a:lnRef>
-          <a:fillRef idx="3">
-            <a:schemeClr val="accent1"/>
-          </a:fillRef>
-          <a:effectRef idx="2">
-            <a:schemeClr val="accent1"/>
-          </a:effectRef>
-          <a:fontRef idx="minor">
-            <a:schemeClr val="lt1"/>
-          </a:fontRef>
-        </p:style>
-        <p:txBody>
-          <a:bodyPr rtlCol="0" anchor="ctr"/>
-          <a:lstStyle/>
-          <a:p>
-            <a:pPr algn="ctr"/>
-            <a:r>
-              <a:rPr lang="en-US" sz="1200" dirty="0" smtClean="0">
-                <a:solidFill>
-                  <a:srgbClr val="000000"/>
-                </a:solidFill>
-              </a:rPr>
-              <a:t>Kitty Graphic</a:t>
-            </a:r>
-            <a:endParaRPr lang="en-US" sz="1200" dirty="0">
-              <a:solidFill>
-                <a:srgbClr val="000000"/>
-              </a:solidFill>
-            </a:endParaRPr>
-          </a:p>
-        </p:txBody>
-      </p:sp>
-      <p:sp>
-        <p:nvSpPr>
-          <p:cNvPr id="13" name="Rectangle 12"/>
-          <p:cNvSpPr/>
-          <p:nvPr/>
-        </p:nvSpPr>
-        <p:spPr>
-          <a:xfrm>
-            <a:off x="2350378" y="2671874"/>
-            <a:ext cx="1221099" cy="260482"/>
-          </a:xfrm>
-          <a:prstGeom prst="rect">
-            <a:avLst/>
-          </a:prstGeom>
-          <a:solidFill>
-            <a:schemeClr val="accent6">
-              <a:lumMod val="60000"/>
-              <a:lumOff val="40000"/>
-            </a:schemeClr>
-          </a:solidFill>
-          <a:ln>
-            <a:noFill/>
-          </a:ln>
-        </p:spPr>
-        <p:style>
-          <a:lnRef idx="1">
-            <a:schemeClr val="accent1"/>
-          </a:lnRef>
-          <a:fillRef idx="3">
-            <a:schemeClr val="accent1"/>
-          </a:fillRef>
-          <a:effectRef idx="2">
-            <a:schemeClr val="accent1"/>
-          </a:effectRef>
-          <a:fontRef idx="minor">
-            <a:schemeClr val="lt1"/>
-          </a:fontRef>
-        </p:style>
-        <p:txBody>
-          <a:bodyPr rtlCol="0" anchor="ctr"/>
-          <a:lstStyle/>
-          <a:p>
-            <a:pPr algn="ctr"/>
-            <a:r>
-              <a:rPr lang="en-US" sz="1200" dirty="0" smtClean="0">
-                <a:solidFill>
-                  <a:srgbClr val="000000"/>
-                </a:solidFill>
-              </a:rPr>
-              <a:t>Kitty Graphic</a:t>
-            </a:r>
-            <a:endParaRPr lang="en-US" sz="1200" dirty="0">
-              <a:solidFill>
-                <a:srgbClr val="000000"/>
-              </a:solidFill>
-            </a:endParaRPr>
-          </a:p>
-        </p:txBody>
-      </p:sp>
-      <p:sp>
-        <p:nvSpPr>
-          <p:cNvPr id="14" name="Rectangle 13"/>
-          <p:cNvSpPr/>
-          <p:nvPr/>
-        </p:nvSpPr>
-        <p:spPr>
-          <a:xfrm>
-            <a:off x="3811150" y="1400090"/>
-            <a:ext cx="1221099" cy="260482"/>
-          </a:xfrm>
-          <a:prstGeom prst="rect">
-            <a:avLst/>
-          </a:prstGeom>
-          <a:solidFill>
-            <a:schemeClr val="accent6">
-              <a:lumMod val="60000"/>
-              <a:lumOff val="40000"/>
-            </a:schemeClr>
-          </a:solidFill>
-          <a:ln>
-            <a:noFill/>
-          </a:ln>
-        </p:spPr>
-        <p:style>
-          <a:lnRef idx="1">
-            <a:schemeClr val="accent1"/>
-          </a:lnRef>
-          <a:fillRef idx="3">
-            <a:schemeClr val="accent1"/>
-          </a:fillRef>
-          <a:effectRef idx="2">
-            <a:schemeClr val="accent1"/>
-          </a:effectRef>
-          <a:fontRef idx="minor">
-            <a:schemeClr val="lt1"/>
-          </a:fontRef>
-        </p:style>
-        <p:txBody>
-          <a:bodyPr rtlCol="0" anchor="ctr"/>
-          <a:lstStyle/>
-          <a:p>
-            <a:pPr algn="ctr"/>
-            <a:r>
-              <a:rPr lang="en-US" sz="1200" dirty="0" smtClean="0">
-                <a:solidFill>
-                  <a:srgbClr val="000000"/>
-                </a:solidFill>
-              </a:rPr>
-              <a:t>Kitty Graphic</a:t>
-            </a:r>
-            <a:endParaRPr lang="en-US" sz="1200" dirty="0">
-              <a:solidFill>
-                <a:srgbClr val="000000"/>
-              </a:solidFill>
-            </a:endParaRPr>
-          </a:p>
-        </p:txBody>
-      </p:sp>
-      <p:sp>
-        <p:nvSpPr>
-          <p:cNvPr id="15" name="Rectangle 14"/>
-          <p:cNvSpPr/>
-          <p:nvPr/>
-        </p:nvSpPr>
-        <p:spPr>
-          <a:xfrm>
-            <a:off x="3811150" y="1812972"/>
-            <a:ext cx="1221099" cy="260482"/>
-          </a:xfrm>
-          <a:prstGeom prst="rect">
-            <a:avLst/>
-          </a:prstGeom>
-          <a:solidFill>
-            <a:schemeClr val="accent6">
-              <a:lumMod val="60000"/>
-              <a:lumOff val="40000"/>
-            </a:schemeClr>
-          </a:solidFill>
-          <a:ln>
-            <a:noFill/>
-          </a:ln>
-        </p:spPr>
-        <p:style>
-          <a:lnRef idx="1">
-            <a:schemeClr val="accent1"/>
-          </a:lnRef>
-          <a:fillRef idx="3">
-            <a:schemeClr val="accent1"/>
-          </a:fillRef>
-          <a:effectRef idx="2">
-            <a:schemeClr val="accent1"/>
-          </a:effectRef>
-          <a:fontRef idx="minor">
-            <a:schemeClr val="lt1"/>
-          </a:fontRef>
-        </p:style>
-        <p:txBody>
-          <a:bodyPr rtlCol="0" anchor="ctr"/>
-          <a:lstStyle/>
-          <a:p>
-            <a:pPr algn="ctr"/>
-            <a:r>
-              <a:rPr lang="en-US" sz="1200" dirty="0" smtClean="0">
-                <a:solidFill>
-                  <a:srgbClr val="000000"/>
-                </a:solidFill>
-              </a:rPr>
-              <a:t>Kitty Graphic</a:t>
-            </a:r>
-            <a:endParaRPr lang="en-US" sz="1200" dirty="0">
-              <a:solidFill>
-                <a:srgbClr val="000000"/>
-              </a:solidFill>
-            </a:endParaRPr>
-          </a:p>
-        </p:txBody>
-      </p:sp>
-      <p:sp>
-        <p:nvSpPr>
-          <p:cNvPr id="16" name="Rectangle 15"/>
-          <p:cNvSpPr/>
-          <p:nvPr/>
-        </p:nvSpPr>
-        <p:spPr>
-          <a:xfrm>
-            <a:off x="3811150" y="2225854"/>
-            <a:ext cx="1221099" cy="260482"/>
-          </a:xfrm>
-          <a:prstGeom prst="rect">
-            <a:avLst/>
-          </a:prstGeom>
-          <a:solidFill>
-            <a:schemeClr val="accent6">
-              <a:lumMod val="60000"/>
-              <a:lumOff val="40000"/>
-            </a:schemeClr>
-          </a:solidFill>
-          <a:ln>
-            <a:noFill/>
-          </a:ln>
-        </p:spPr>
-        <p:style>
-          <a:lnRef idx="1">
-            <a:schemeClr val="accent1"/>
-          </a:lnRef>
-          <a:fillRef idx="3">
-            <a:schemeClr val="accent1"/>
-          </a:fillRef>
-          <a:effectRef idx="2">
-            <a:schemeClr val="accent1"/>
-          </a:effectRef>
-          <a:fontRef idx="minor">
-            <a:schemeClr val="lt1"/>
-          </a:fontRef>
-        </p:style>
-        <p:txBody>
-          <a:bodyPr rtlCol="0" anchor="ctr"/>
-          <a:lstStyle/>
-          <a:p>
-            <a:pPr algn="ctr"/>
-            <a:r>
-              <a:rPr lang="en-US" sz="1200" dirty="0" smtClean="0">
-                <a:solidFill>
-                  <a:srgbClr val="000000"/>
-                </a:solidFill>
-              </a:rPr>
-              <a:t>Kitty Graphic</a:t>
-            </a:r>
-            <a:endParaRPr lang="en-US" sz="1200" dirty="0">
-              <a:solidFill>
-                <a:srgbClr val="000000"/>
-              </a:solidFill>
-            </a:endParaRPr>
-          </a:p>
-        </p:txBody>
-      </p:sp>
-      <p:sp>
-        <p:nvSpPr>
-          <p:cNvPr id="17" name="Rectangle 16"/>
-          <p:cNvSpPr/>
-          <p:nvPr/>
-        </p:nvSpPr>
-        <p:spPr>
-          <a:xfrm>
-            <a:off x="3811150" y="2667967"/>
-            <a:ext cx="1221099" cy="260482"/>
-          </a:xfrm>
-          <a:prstGeom prst="rect">
-            <a:avLst/>
-          </a:prstGeom>
-          <a:solidFill>
-            <a:schemeClr val="accent6">
-              <a:lumMod val="60000"/>
-              <a:lumOff val="40000"/>
-            </a:schemeClr>
-          </a:solidFill>
-          <a:ln>
-            <a:noFill/>
-          </a:ln>
-        </p:spPr>
-        <p:style>
-          <a:lnRef idx="1">
-            <a:schemeClr val="accent1"/>
-          </a:lnRef>
-          <a:fillRef idx="3">
-            <a:schemeClr val="accent1"/>
-          </a:fillRef>
-          <a:effectRef idx="2">
-            <a:schemeClr val="accent1"/>
-          </a:effectRef>
-          <a:fontRef idx="minor">
-            <a:schemeClr val="lt1"/>
-          </a:fontRef>
-        </p:style>
-        <p:txBody>
-          <a:bodyPr rtlCol="0" anchor="ctr"/>
-          <a:lstStyle/>
-          <a:p>
-            <a:pPr algn="ctr"/>
-            <a:r>
-              <a:rPr lang="en-US" sz="1200" dirty="0" smtClean="0">
-                <a:solidFill>
-                  <a:srgbClr val="000000"/>
-                </a:solidFill>
-              </a:rPr>
-              <a:t>Kitty Graphic</a:t>
-            </a:r>
-            <a:endParaRPr lang="en-US" sz="1200" dirty="0">
-              <a:solidFill>
-                <a:srgbClr val="000000"/>
-              </a:solidFill>
-            </a:endParaRPr>
-          </a:p>
-        </p:txBody>
-      </p:sp>
-      <p:sp>
-        <p:nvSpPr>
-          <p:cNvPr id="18" name="Rectangle 17"/>
-          <p:cNvSpPr/>
-          <p:nvPr/>
-        </p:nvSpPr>
-        <p:spPr>
-          <a:xfrm>
-            <a:off x="5238041" y="1411811"/>
-            <a:ext cx="1221099" cy="260482"/>
-          </a:xfrm>
-          <a:prstGeom prst="rect">
-            <a:avLst/>
-          </a:prstGeom>
-          <a:solidFill>
-            <a:schemeClr val="accent6">
-              <a:lumMod val="60000"/>
-              <a:lumOff val="40000"/>
-            </a:schemeClr>
-          </a:solidFill>
-          <a:ln>
-            <a:noFill/>
-          </a:ln>
-        </p:spPr>
-        <p:style>
-          <a:lnRef idx="1">
-            <a:schemeClr val="accent1"/>
-          </a:lnRef>
-          <a:fillRef idx="3">
-            <a:schemeClr val="accent1"/>
-          </a:fillRef>
-          <a:effectRef idx="2">
-            <a:schemeClr val="accent1"/>
-          </a:effectRef>
-          <a:fontRef idx="minor">
-            <a:schemeClr val="lt1"/>
-          </a:fontRef>
-        </p:style>
-        <p:txBody>
-          <a:bodyPr rtlCol="0" anchor="ctr"/>
-          <a:lstStyle/>
-          <a:p>
-            <a:pPr algn="ctr"/>
-            <a:r>
-              <a:rPr lang="en-US" sz="1200" dirty="0" smtClean="0">
-                <a:solidFill>
-                  <a:srgbClr val="000000"/>
-                </a:solidFill>
-              </a:rPr>
-              <a:t>Kitty Graphic</a:t>
-            </a:r>
-            <a:endParaRPr lang="en-US" sz="1200" dirty="0">
-              <a:solidFill>
-                <a:srgbClr val="000000"/>
-              </a:solidFill>
-            </a:endParaRPr>
-          </a:p>
-        </p:txBody>
-      </p:sp>
-      <p:sp>
-        <p:nvSpPr>
-          <p:cNvPr id="19" name="Rectangle 18"/>
-          <p:cNvSpPr/>
-          <p:nvPr/>
-        </p:nvSpPr>
-        <p:spPr>
-          <a:xfrm>
-            <a:off x="5238041" y="1824693"/>
-            <a:ext cx="1221099" cy="260482"/>
-          </a:xfrm>
-          <a:prstGeom prst="rect">
-            <a:avLst/>
-          </a:prstGeom>
-          <a:solidFill>
-            <a:schemeClr val="accent6">
-              <a:lumMod val="60000"/>
-              <a:lumOff val="40000"/>
-            </a:schemeClr>
-          </a:solidFill>
-          <a:ln>
-            <a:noFill/>
-          </a:ln>
-        </p:spPr>
-        <p:style>
-          <a:lnRef idx="1">
-            <a:schemeClr val="accent1"/>
-          </a:lnRef>
-          <a:fillRef idx="3">
-            <a:schemeClr val="accent1"/>
-          </a:fillRef>
-          <a:effectRef idx="2">
-            <a:schemeClr val="accent1"/>
-          </a:effectRef>
-          <a:fontRef idx="minor">
-            <a:schemeClr val="lt1"/>
-          </a:fontRef>
-        </p:style>
-        <p:txBody>
-          <a:bodyPr rtlCol="0" anchor="ctr"/>
-          <a:lstStyle/>
-          <a:p>
-            <a:pPr algn="ctr"/>
-            <a:r>
-              <a:rPr lang="en-US" sz="1200" dirty="0" smtClean="0">
-                <a:solidFill>
-                  <a:srgbClr val="000000"/>
-                </a:solidFill>
-              </a:rPr>
-              <a:t>Kitty Graphic</a:t>
-            </a:r>
-            <a:endParaRPr lang="en-US" sz="1200" dirty="0">
-              <a:solidFill>
-                <a:srgbClr val="000000"/>
-              </a:solidFill>
-            </a:endParaRPr>
-          </a:p>
-        </p:txBody>
-      </p:sp>
-      <p:sp>
-        <p:nvSpPr>
-          <p:cNvPr id="20" name="Rectangle 19"/>
-          <p:cNvSpPr/>
-          <p:nvPr/>
-        </p:nvSpPr>
-        <p:spPr>
-          <a:xfrm>
-            <a:off x="5238041" y="2237575"/>
-            <a:ext cx="1221099" cy="260482"/>
-          </a:xfrm>
-          <a:prstGeom prst="rect">
-            <a:avLst/>
-          </a:prstGeom>
-          <a:solidFill>
-            <a:schemeClr val="accent6">
-              <a:lumMod val="60000"/>
-              <a:lumOff val="40000"/>
-            </a:schemeClr>
-          </a:solidFill>
-          <a:ln>
-            <a:noFill/>
-          </a:ln>
-        </p:spPr>
-        <p:style>
-          <a:lnRef idx="1">
-            <a:schemeClr val="accent1"/>
-          </a:lnRef>
-          <a:fillRef idx="3">
-            <a:schemeClr val="accent1"/>
-          </a:fillRef>
-          <a:effectRef idx="2">
-            <a:schemeClr val="accent1"/>
-          </a:effectRef>
-          <a:fontRef idx="minor">
-            <a:schemeClr val="lt1"/>
-          </a:fontRef>
-        </p:style>
-        <p:txBody>
-          <a:bodyPr rtlCol="0" anchor="ctr"/>
-          <a:lstStyle/>
-          <a:p>
-            <a:pPr algn="ctr"/>
-            <a:r>
-              <a:rPr lang="en-US" sz="1200" dirty="0" smtClean="0">
-                <a:solidFill>
-                  <a:srgbClr val="000000"/>
-                </a:solidFill>
-              </a:rPr>
-              <a:t>Kitty Graphic</a:t>
-            </a:r>
-            <a:endParaRPr lang="en-US" sz="1200" dirty="0">
-              <a:solidFill>
-                <a:srgbClr val="000000"/>
-              </a:solidFill>
-            </a:endParaRPr>
-          </a:p>
-        </p:txBody>
-      </p:sp>
-      <p:sp>
-        <p:nvSpPr>
-          <p:cNvPr id="21" name="Rectangle 20"/>
-          <p:cNvSpPr/>
-          <p:nvPr/>
-        </p:nvSpPr>
-        <p:spPr>
-          <a:xfrm>
-            <a:off x="5238041" y="2679688"/>
-            <a:ext cx="1221099" cy="260482"/>
-          </a:xfrm>
-          <a:prstGeom prst="rect">
-            <a:avLst/>
-          </a:prstGeom>
-          <a:solidFill>
-            <a:schemeClr val="accent6">
-              <a:lumMod val="60000"/>
-              <a:lumOff val="40000"/>
-            </a:schemeClr>
-          </a:solidFill>
-          <a:ln>
-            <a:noFill/>
-          </a:ln>
-        </p:spPr>
-        <p:style>
-          <a:lnRef idx="1">
-            <a:schemeClr val="accent1"/>
-          </a:lnRef>
-          <a:fillRef idx="3">
-            <a:schemeClr val="accent1"/>
-          </a:fillRef>
-          <a:effectRef idx="2">
-            <a:schemeClr val="accent1"/>
-          </a:effectRef>
-          <a:fontRef idx="minor">
-            <a:schemeClr val="lt1"/>
-          </a:fontRef>
-        </p:style>
-        <p:txBody>
-          <a:bodyPr rtlCol="0" anchor="ctr"/>
-          <a:lstStyle/>
-          <a:p>
-            <a:pPr algn="ctr"/>
-            <a:r>
-              <a:rPr lang="en-US" sz="1200" dirty="0" smtClean="0">
-                <a:solidFill>
-                  <a:srgbClr val="000000"/>
-                </a:solidFill>
-              </a:rPr>
-              <a:t>Kitty Graphic</a:t>
-            </a:r>
-            <a:endParaRPr lang="en-US" sz="1200" dirty="0">
-              <a:solidFill>
-                <a:srgbClr val="000000"/>
-              </a:solidFill>
-            </a:endParaRPr>
-          </a:p>
-        </p:txBody>
-      </p:sp>
-      <p:sp>
-        <p:nvSpPr>
-          <p:cNvPr id="22" name="Rectangle 21"/>
-          <p:cNvSpPr/>
-          <p:nvPr/>
-        </p:nvSpPr>
-        <p:spPr>
-          <a:xfrm>
-            <a:off x="6741791" y="1400090"/>
-            <a:ext cx="1221099" cy="260482"/>
-          </a:xfrm>
-          <a:prstGeom prst="rect">
-            <a:avLst/>
-          </a:prstGeom>
-          <a:solidFill>
-            <a:schemeClr val="accent6">
-              <a:lumMod val="60000"/>
-              <a:lumOff val="40000"/>
-            </a:schemeClr>
-          </a:solidFill>
-          <a:ln>
-            <a:noFill/>
-          </a:ln>
-        </p:spPr>
-        <p:style>
-          <a:lnRef idx="1">
-            <a:schemeClr val="accent1"/>
-          </a:lnRef>
-          <a:fillRef idx="3">
-            <a:schemeClr val="accent1"/>
-          </a:fillRef>
-          <a:effectRef idx="2">
-            <a:schemeClr val="accent1"/>
-          </a:effectRef>
-          <a:fontRef idx="minor">
-            <a:schemeClr val="lt1"/>
-          </a:fontRef>
-        </p:style>
-        <p:txBody>
-          <a:bodyPr rtlCol="0" anchor="ctr"/>
-          <a:lstStyle/>
-          <a:p>
-            <a:pPr algn="ctr"/>
-            <a:r>
-              <a:rPr lang="en-US" sz="1200" dirty="0" smtClean="0">
-                <a:solidFill>
-                  <a:srgbClr val="000000"/>
-                </a:solidFill>
-              </a:rPr>
-              <a:t>Kitty Graphic</a:t>
-            </a:r>
-            <a:endParaRPr lang="en-US" sz="1200" dirty="0">
-              <a:solidFill>
-                <a:srgbClr val="000000"/>
-              </a:solidFill>
-            </a:endParaRPr>
-          </a:p>
-        </p:txBody>
-      </p:sp>
-      <p:sp>
-        <p:nvSpPr>
-          <p:cNvPr id="23" name="Rectangle 22"/>
-          <p:cNvSpPr/>
-          <p:nvPr/>
-        </p:nvSpPr>
-        <p:spPr>
-          <a:xfrm>
-            <a:off x="6741791" y="1812972"/>
-            <a:ext cx="1221099" cy="260482"/>
-          </a:xfrm>
-          <a:prstGeom prst="rect">
-            <a:avLst/>
-          </a:prstGeom>
-          <a:solidFill>
-            <a:schemeClr val="accent6">
-              <a:lumMod val="60000"/>
-              <a:lumOff val="40000"/>
-            </a:schemeClr>
-          </a:solidFill>
-          <a:ln>
-            <a:noFill/>
-          </a:ln>
-        </p:spPr>
-        <p:style>
-          <a:lnRef idx="1">
-            <a:schemeClr val="accent1"/>
-          </a:lnRef>
-          <a:fillRef idx="3">
-            <a:schemeClr val="accent1"/>
-          </a:fillRef>
-          <a:effectRef idx="2">
-            <a:schemeClr val="accent1"/>
-          </a:effectRef>
-          <a:fontRef idx="minor">
-            <a:schemeClr val="lt1"/>
-          </a:fontRef>
-        </p:style>
-        <p:txBody>
-          <a:bodyPr rtlCol="0" anchor="ctr"/>
-          <a:lstStyle/>
-          <a:p>
-            <a:pPr algn="ctr"/>
-            <a:r>
-              <a:rPr lang="en-US" sz="1200" dirty="0" smtClean="0">
-                <a:solidFill>
-                  <a:srgbClr val="000000"/>
-                </a:solidFill>
-              </a:rPr>
-              <a:t>Kitty Graphic</a:t>
-            </a:r>
-            <a:endParaRPr lang="en-US" sz="1200" dirty="0">
-              <a:solidFill>
-                <a:srgbClr val="000000"/>
-              </a:solidFill>
-            </a:endParaRPr>
-          </a:p>
-        </p:txBody>
-      </p:sp>
-      <p:sp>
-        <p:nvSpPr>
-          <p:cNvPr id="24" name="Rectangle 23"/>
-          <p:cNvSpPr/>
-          <p:nvPr/>
-        </p:nvSpPr>
-        <p:spPr>
-          <a:xfrm>
-            <a:off x="6741791" y="2225854"/>
-            <a:ext cx="1221099" cy="260482"/>
-          </a:xfrm>
-          <a:prstGeom prst="rect">
-            <a:avLst/>
-          </a:prstGeom>
-          <a:solidFill>
-            <a:schemeClr val="accent6">
-              <a:lumMod val="60000"/>
-              <a:lumOff val="40000"/>
-            </a:schemeClr>
-          </a:solidFill>
-          <a:ln>
-            <a:noFill/>
-          </a:ln>
-        </p:spPr>
-        <p:style>
-          <a:lnRef idx="1">
-            <a:schemeClr val="accent1"/>
-          </a:lnRef>
-          <a:fillRef idx="3">
-            <a:schemeClr val="accent1"/>
-          </a:fillRef>
-          <a:effectRef idx="2">
-            <a:schemeClr val="accent1"/>
-          </a:effectRef>
-          <a:fontRef idx="minor">
-            <a:schemeClr val="lt1"/>
-          </a:fontRef>
-        </p:style>
-        <p:txBody>
-          <a:bodyPr rtlCol="0" anchor="ctr"/>
-          <a:lstStyle/>
-          <a:p>
-            <a:pPr algn="ctr"/>
-            <a:r>
-              <a:rPr lang="en-US" sz="1200" dirty="0" smtClean="0">
-                <a:solidFill>
-                  <a:srgbClr val="000000"/>
-                </a:solidFill>
-              </a:rPr>
-              <a:t>Kitty Graphic</a:t>
-            </a:r>
-            <a:endParaRPr lang="en-US" sz="1200" dirty="0">
-              <a:solidFill>
-                <a:srgbClr val="000000"/>
-              </a:solidFill>
-            </a:endParaRPr>
-          </a:p>
-        </p:txBody>
-      </p:sp>
-      <p:sp>
-        <p:nvSpPr>
-          <p:cNvPr id="25" name="Rectangle 24"/>
-          <p:cNvSpPr/>
-          <p:nvPr/>
-        </p:nvSpPr>
-        <p:spPr>
-          <a:xfrm>
-            <a:off x="6741791" y="2667967"/>
-            <a:ext cx="1221099" cy="260482"/>
-          </a:xfrm>
-          <a:prstGeom prst="rect">
-            <a:avLst/>
-          </a:prstGeom>
-          <a:solidFill>
-            <a:schemeClr val="accent6">
-              <a:lumMod val="60000"/>
-              <a:lumOff val="40000"/>
-            </a:schemeClr>
-          </a:solidFill>
-          <a:ln>
-            <a:noFill/>
-          </a:ln>
-        </p:spPr>
-        <p:style>
-          <a:lnRef idx="1">
-            <a:schemeClr val="accent1"/>
-          </a:lnRef>
-          <a:fillRef idx="3">
-            <a:schemeClr val="accent1"/>
-          </a:fillRef>
-          <a:effectRef idx="2">
-            <a:schemeClr val="accent1"/>
-          </a:effectRef>
-          <a:fontRef idx="minor">
-            <a:schemeClr val="lt1"/>
-          </a:fontRef>
-        </p:style>
-        <p:txBody>
-          <a:bodyPr rtlCol="0" anchor="ctr"/>
-          <a:lstStyle/>
-          <a:p>
-            <a:pPr algn="ctr"/>
-            <a:r>
-              <a:rPr lang="en-US" sz="1200" dirty="0" smtClean="0">
-                <a:solidFill>
-                  <a:srgbClr val="000000"/>
-                </a:solidFill>
-              </a:rPr>
-              <a:t>Kitty Graphic</a:t>
-            </a:r>
-            <a:endParaRPr lang="en-US" sz="1200" dirty="0">
-              <a:solidFill>
-                <a:srgbClr val="000000"/>
-              </a:solidFill>
-            </a:endParaRPr>
-          </a:p>
-        </p:txBody>
-      </p:sp>
-      <p:pic>
-        <p:nvPicPr>
-          <p:cNvPr id="37" name="Picture 36"/>
-          <p:cNvPicPr>
-            <a:picLocks noChangeAspect="1"/>
-          </p:cNvPicPr>
-          <p:nvPr/>
-        </p:nvPicPr>
-        <p:blipFill rotWithShape="1">
-          <a:blip r:embed="rId2"/>
-          <a:srcRect t="55455" r="26118"/>
-          <a:stretch/>
-        </p:blipFill>
-        <p:spPr>
-          <a:xfrm>
-            <a:off x="4672742" y="5534713"/>
-            <a:ext cx="4119176" cy="928494"/>
-          </a:xfrm>
-          <a:prstGeom prst="rect">
-            <a:avLst/>
-          </a:prstGeom>
-        </p:spPr>
-      </p:pic>
-      <p:pic>
-        <p:nvPicPr>
-          <p:cNvPr id="36" name="Picture 35"/>
-          <p:cNvPicPr>
-            <a:picLocks noChangeAspect="1"/>
-          </p:cNvPicPr>
-          <p:nvPr/>
-        </p:nvPicPr>
-        <p:blipFill rotWithShape="1">
-          <a:blip r:embed="rId2"/>
-          <a:srcRect t="55455" r="22258"/>
-          <a:stretch/>
-        </p:blipFill>
-        <p:spPr>
-          <a:xfrm>
-            <a:off x="338370" y="5534950"/>
-            <a:ext cx="4334371" cy="928494"/>
-          </a:xfrm>
-          <a:prstGeom prst="rect">
-            <a:avLst/>
-          </a:prstGeom>
-        </p:spPr>
-      </p:pic>
-      <p:pic>
-        <p:nvPicPr>
-          <p:cNvPr id="27" name="Picture 26"/>
-          <p:cNvPicPr>
-            <a:picLocks noChangeAspect="1"/>
-          </p:cNvPicPr>
-          <p:nvPr/>
-        </p:nvPicPr>
-        <p:blipFill>
-          <a:blip r:embed="rId3">
-            <a:extLst>
-              <a:ext uri="{BEBA8EAE-BF5A-486C-A8C5-ECC9F3942E4B}">
-                <a14:imgProps xmlns:a14="http://schemas.microsoft.com/office/drawing/2010/main">
-                  <a14:imgLayer r:embed="rId4">
-                    <a14:imgEffect>
-                      <a14:backgroundRemoval t="9794" b="89691" l="5792" r="94788"/>
-                    </a14:imgEffect>
-                  </a14:imgLayer>
-                </a14:imgProps>
-              </a:ext>
-            </a:extLst>
-          </a:blip>
-          <a:stretch>
-            <a:fillRect/>
-          </a:stretch>
-        </p:blipFill>
-        <p:spPr>
-          <a:xfrm>
-            <a:off x="3647092" y="5405000"/>
-            <a:ext cx="1635247" cy="771264"/>
-          </a:xfrm>
-          <a:prstGeom prst="rect">
-            <a:avLst/>
-          </a:prstGeom>
-        </p:spPr>
-      </p:pic>
-      <p:pic>
-        <p:nvPicPr>
-          <p:cNvPr id="28" name="Picture 27"/>
-          <p:cNvPicPr>
-            <a:picLocks noChangeAspect="1"/>
-          </p:cNvPicPr>
-          <p:nvPr/>
-        </p:nvPicPr>
-        <p:blipFill>
-          <a:blip r:embed="rId5">
-            <a:extLst>
-              <a:ext uri="{BEBA8EAE-BF5A-486C-A8C5-ECC9F3942E4B}">
-                <a14:imgProps xmlns:a14="http://schemas.microsoft.com/office/drawing/2010/main">
-                  <a14:imgLayer r:embed="rId6">
-                    <a14:imgEffect>
-                      <a14:backgroundRemoval t="5667" b="95667" l="5167" r="93000"/>
-                    </a14:imgEffect>
-                  </a14:imgLayer>
-                </a14:imgProps>
-              </a:ext>
-            </a:extLst>
-          </a:blip>
-          <a:stretch>
-            <a:fillRect/>
-          </a:stretch>
-        </p:blipFill>
-        <p:spPr>
-          <a:xfrm>
-            <a:off x="6070377" y="4566273"/>
-            <a:ext cx="307357" cy="307357"/>
-          </a:xfrm>
-          <a:prstGeom prst="rect">
-            <a:avLst/>
-          </a:prstGeom>
-        </p:spPr>
-      </p:pic>
-      <p:cxnSp>
-        <p:nvCxnSpPr>
-          <p:cNvPr id="30" name="Straight Arrow Connector 29"/>
-          <p:cNvCxnSpPr/>
-          <p:nvPr/>
-        </p:nvCxnSpPr>
-        <p:spPr>
-          <a:xfrm>
-            <a:off x="1481589" y="3304864"/>
-            <a:ext cx="0" cy="618645"/>
-          </a:xfrm>
-          <a:prstGeom prst="straightConnector1">
-            <a:avLst/>
-          </a:prstGeom>
-          <a:ln>
-            <a:tailEnd type="arrow"/>
-          </a:ln>
-        </p:spPr>
-        <p:style>
-          <a:lnRef idx="2">
-            <a:schemeClr val="dk1"/>
-          </a:lnRef>
-          <a:fillRef idx="0">
-            <a:schemeClr val="dk1"/>
-          </a:fillRef>
-          <a:effectRef idx="1">
-            <a:schemeClr val="dk1"/>
-          </a:effectRef>
-          <a:fontRef idx="minor">
-            <a:schemeClr val="tx1"/>
-          </a:fontRef>
-        </p:style>
-      </p:cxnSp>
-      <p:cxnSp>
-        <p:nvCxnSpPr>
-          <p:cNvPr id="31" name="Straight Arrow Connector 30"/>
-          <p:cNvCxnSpPr/>
-          <p:nvPr/>
-        </p:nvCxnSpPr>
-        <p:spPr>
-          <a:xfrm>
-            <a:off x="2952785" y="3304864"/>
-            <a:ext cx="0" cy="618645"/>
-          </a:xfrm>
-          <a:prstGeom prst="straightConnector1">
-            <a:avLst/>
-          </a:prstGeom>
-          <a:ln>
-            <a:tailEnd type="arrow"/>
-          </a:ln>
-        </p:spPr>
-        <p:style>
-          <a:lnRef idx="2">
-            <a:schemeClr val="dk1"/>
-          </a:lnRef>
-          <a:fillRef idx="0">
-            <a:schemeClr val="dk1"/>
-          </a:fillRef>
-          <a:effectRef idx="1">
-            <a:schemeClr val="dk1"/>
-          </a:effectRef>
-          <a:fontRef idx="minor">
-            <a:schemeClr val="tx1"/>
-          </a:fontRef>
-        </p:style>
-      </p:cxnSp>
-      <p:cxnSp>
-        <p:nvCxnSpPr>
-          <p:cNvPr id="32" name="Straight Arrow Connector 31"/>
-          <p:cNvCxnSpPr/>
-          <p:nvPr/>
-        </p:nvCxnSpPr>
-        <p:spPr>
-          <a:xfrm>
-            <a:off x="4418096" y="3304864"/>
-            <a:ext cx="0" cy="618645"/>
-          </a:xfrm>
-          <a:prstGeom prst="straightConnector1">
-            <a:avLst/>
-          </a:prstGeom>
-          <a:ln>
-            <a:tailEnd type="arrow"/>
-          </a:ln>
-        </p:spPr>
-        <p:style>
-          <a:lnRef idx="2">
-            <a:schemeClr val="dk1"/>
-          </a:lnRef>
-          <a:fillRef idx="0">
-            <a:schemeClr val="dk1"/>
-          </a:fillRef>
-          <a:effectRef idx="1">
-            <a:schemeClr val="dk1"/>
-          </a:effectRef>
-          <a:fontRef idx="minor">
-            <a:schemeClr val="tx1"/>
-          </a:fontRef>
-        </p:style>
-      </p:cxnSp>
-      <p:cxnSp>
-        <p:nvCxnSpPr>
-          <p:cNvPr id="33" name="Straight Arrow Connector 32"/>
-          <p:cNvCxnSpPr/>
-          <p:nvPr/>
-        </p:nvCxnSpPr>
-        <p:spPr>
-          <a:xfrm>
-            <a:off x="5889292" y="3304864"/>
-            <a:ext cx="0" cy="618645"/>
-          </a:xfrm>
-          <a:prstGeom prst="straightConnector1">
-            <a:avLst/>
-          </a:prstGeom>
-          <a:ln>
-            <a:tailEnd type="arrow"/>
-          </a:ln>
-        </p:spPr>
-        <p:style>
-          <a:lnRef idx="2">
-            <a:schemeClr val="dk1"/>
-          </a:lnRef>
-          <a:fillRef idx="0">
-            <a:schemeClr val="dk1"/>
-          </a:fillRef>
-          <a:effectRef idx="1">
-            <a:schemeClr val="dk1"/>
-          </a:effectRef>
-          <a:fontRef idx="minor">
-            <a:schemeClr val="tx1"/>
-          </a:fontRef>
-        </p:style>
-      </p:cxnSp>
-      <p:cxnSp>
-        <p:nvCxnSpPr>
-          <p:cNvPr id="34" name="Straight Arrow Connector 33"/>
-          <p:cNvCxnSpPr/>
-          <p:nvPr/>
-        </p:nvCxnSpPr>
-        <p:spPr>
-          <a:xfrm>
-            <a:off x="7344198" y="3304864"/>
-            <a:ext cx="0" cy="618645"/>
-          </a:xfrm>
-          <a:prstGeom prst="straightConnector1">
-            <a:avLst/>
-          </a:prstGeom>
-          <a:ln>
-            <a:tailEnd type="arrow"/>
-          </a:ln>
-        </p:spPr>
-        <p:style>
-          <a:lnRef idx="2">
-            <a:schemeClr val="dk1"/>
-          </a:lnRef>
-          <a:fillRef idx="0">
-            <a:schemeClr val="dk1"/>
-          </a:fillRef>
-          <a:effectRef idx="1">
-            <a:schemeClr val="dk1"/>
-          </a:effectRef>
-          <a:fontRef idx="minor">
-            <a:schemeClr val="tx1"/>
-          </a:fontRef>
-        </p:style>
-      </p:cxnSp>
-      <p:sp>
-        <p:nvSpPr>
-          <p:cNvPr id="35" name="TextBox 34"/>
-          <p:cNvSpPr txBox="1"/>
-          <p:nvPr/>
-        </p:nvSpPr>
-        <p:spPr>
-          <a:xfrm>
-            <a:off x="2740458" y="3991065"/>
-            <a:ext cx="3355275" cy="307777"/>
-          </a:xfrm>
-          <a:prstGeom prst="rect">
-            <a:avLst/>
-          </a:prstGeom>
-          <a:noFill/>
-        </p:spPr>
-        <p:txBody>
-          <a:bodyPr wrap="square" rtlCol="0">
-            <a:spAutoFit/>
-          </a:bodyPr>
-          <a:lstStyle/>
-          <a:p>
-            <a:pPr algn="ctr"/>
-            <a:r>
-              <a:rPr lang="en-US" sz="1400" dirty="0" smtClean="0">
-                <a:latin typeface="Helvetica"/>
-                <a:cs typeface="Helvetica"/>
-              </a:rPr>
-              <a:t>Kitties move down every x seconds</a:t>
-            </a:r>
-            <a:endParaRPr lang="en-US" sz="1400" dirty="0">
-              <a:latin typeface="Helvetica"/>
-              <a:cs typeface="Helvetica"/>
-            </a:endParaRPr>
-          </a:p>
-        </p:txBody>
-      </p:sp>
-      <p:sp>
-        <p:nvSpPr>
-          <p:cNvPr id="38" name="TextBox 37"/>
-          <p:cNvSpPr txBox="1"/>
-          <p:nvPr/>
-        </p:nvSpPr>
-        <p:spPr>
-          <a:xfrm>
-            <a:off x="358195" y="5209638"/>
-            <a:ext cx="4477359" cy="307777"/>
-          </a:xfrm>
-          <a:prstGeom prst="rect">
-            <a:avLst/>
-          </a:prstGeom>
-          <a:noFill/>
-        </p:spPr>
-        <p:txBody>
-          <a:bodyPr wrap="square" rtlCol="0">
-            <a:spAutoFit/>
-          </a:bodyPr>
-          <a:lstStyle/>
-          <a:p>
-            <a:r>
-              <a:rPr lang="en-US" sz="1400" dirty="0" smtClean="0">
-                <a:latin typeface="Helvetica"/>
-                <a:cs typeface="Helvetica"/>
-              </a:rPr>
-              <a:t>Don’t let the kitties reach the fence!</a:t>
-            </a:r>
-            <a:endParaRPr lang="en-US" sz="1400" dirty="0">
-              <a:latin typeface="Helvetica"/>
-              <a:cs typeface="Helvetica"/>
-            </a:endParaRPr>
-          </a:p>
-        </p:txBody>
-      </p:sp>
-    </p:spTree>
-    <p:extLst>
-      <p:ext uri="{BB962C8B-B14F-4D97-AF65-F5344CB8AC3E}">
-        <p14:creationId xmlns:p14="http://schemas.microsoft.com/office/powerpoint/2010/main" val="2729354336"/>
-      </p:ext>
-    </p:extLst>
-  </p:cSld>
-  <p:clrMapOvr>
-    <a:masterClrMapping/>
-  </p:clrMapOvr>
-  <p:timing>
-    <p:tnLst>
-      <p:par>
-        <p:cTn xmlns:p14="http://schemas.microsoft.com/office/powerpoint/2010/main" id="1" dur="indefinite" restart="never" nodeType="tmRoot"/>
-      </p:par>
-    </p:tnLst>
-  </p:timing>
-</p:sld>
-</file>
-
 <file path=ppt/theme/theme1.xml><?xml version="1.0" encoding="utf-8"?>
 <a:theme xmlns:a="http://schemas.openxmlformats.org/drawingml/2006/main" name="Office Theme">
   <a:themeElements>

</xml_diff>